<commit_message>
Added to BB and Jan and Dean
</commit_message>
<xml_diff>
--- a/HSTR121/ppts/Beach Boys, Surf Music, and Hot.pptx
+++ b/HSTR121/ppts/Beach Boys, Surf Music, and Hot.pptx
@@ -4,15 +4,21 @@
   <p:sldMasterIdLst>
     <p:sldMasterId id="2147483648" r:id="rId1"/>
   </p:sldMasterIdLst>
+  <p:notesMasterIdLst>
+    <p:notesMasterId r:id="rId13"/>
+  </p:notesMasterIdLst>
   <p:sldIdLst>
     <p:sldId id="256" r:id="rId2"/>
     <p:sldId id="258" r:id="rId3"/>
     <p:sldId id="257" r:id="rId4"/>
     <p:sldId id="259" r:id="rId5"/>
     <p:sldId id="260" r:id="rId6"/>
-    <p:sldId id="261" r:id="rId7"/>
-    <p:sldId id="262" r:id="rId8"/>
-    <p:sldId id="263" r:id="rId9"/>
+    <p:sldId id="265" r:id="rId7"/>
+    <p:sldId id="266" r:id="rId8"/>
+    <p:sldId id="261" r:id="rId9"/>
+    <p:sldId id="264" r:id="rId10"/>
+    <p:sldId id="262" r:id="rId11"/>
+    <p:sldId id="263" r:id="rId12"/>
   </p:sldIdLst>
   <p:sldSz cx="12192000" cy="6858000"/>
   <p:notesSz cx="6858000" cy="9144000"/>
@@ -119,6 +125,447 @@
 </p:presentation>
 </file>
 
+<file path=ppt/revisionInfo.xml><?xml version="1.0" encoding="utf-8"?>
+<p1510:revInfo xmlns:a="http://schemas.openxmlformats.org/drawingml/2006/main" xmlns:r="http://schemas.openxmlformats.org/officeDocument/2006/relationships" xmlns:p1510="http://schemas.microsoft.com/office/powerpoint/2015/10/main"/>
+</file>
+
+<file path=ppt/notesMasters/notesMaster1.xml><?xml version="1.0" encoding="utf-8"?>
+<p:notesMaster xmlns:a="http://schemas.openxmlformats.org/drawingml/2006/main" xmlns:r="http://schemas.openxmlformats.org/officeDocument/2006/relationships" xmlns:p="http://schemas.openxmlformats.org/presentationml/2006/main">
+  <p:cSld>
+    <p:bg>
+      <p:bgRef idx="1001">
+        <a:schemeClr val="bg1"/>
+      </p:bgRef>
+    </p:bg>
+    <p:spTree>
+      <p:nvGrpSpPr>
+        <p:cNvPr id="1" name=""/>
+        <p:cNvGrpSpPr/>
+        <p:nvPr/>
+      </p:nvGrpSpPr>
+      <p:grpSpPr>
+        <a:xfrm>
+          <a:off x="0" y="0"/>
+          <a:ext cx="0" cy="0"/>
+          <a:chOff x="0" y="0"/>
+          <a:chExt cx="0" cy="0"/>
+        </a:xfrm>
+      </p:grpSpPr>
+      <p:sp>
+        <p:nvSpPr>
+          <p:cNvPr id="2" name="Header Placeholder 1"/>
+          <p:cNvSpPr>
+            <a:spLocks noGrp="1"/>
+          </p:cNvSpPr>
+          <p:nvPr>
+            <p:ph type="hdr" sz="quarter"/>
+          </p:nvPr>
+        </p:nvSpPr>
+        <p:spPr>
+          <a:xfrm>
+            <a:off x="0" y="0"/>
+            <a:ext cx="2971800" cy="458788"/>
+          </a:xfrm>
+          <a:prstGeom prst="rect">
+            <a:avLst/>
+          </a:prstGeom>
+        </p:spPr>
+        <p:txBody>
+          <a:bodyPr vert="horz" lIns="91440" tIns="45720" rIns="91440" bIns="45720" rtlCol="0"/>
+          <a:lstStyle>
+            <a:lvl1pPr algn="l">
+              <a:defRPr sz="1200"/>
+            </a:lvl1pPr>
+          </a:lstStyle>
+          <a:p>
+            <a:endParaRPr lang="en-CA"/>
+          </a:p>
+        </p:txBody>
+      </p:sp>
+      <p:sp>
+        <p:nvSpPr>
+          <p:cNvPr id="3" name="Date Placeholder 2"/>
+          <p:cNvSpPr>
+            <a:spLocks noGrp="1"/>
+          </p:cNvSpPr>
+          <p:nvPr>
+            <p:ph type="dt" idx="1"/>
+          </p:nvPr>
+        </p:nvSpPr>
+        <p:spPr>
+          <a:xfrm>
+            <a:off x="3884613" y="0"/>
+            <a:ext cx="2971800" cy="458788"/>
+          </a:xfrm>
+          <a:prstGeom prst="rect">
+            <a:avLst/>
+          </a:prstGeom>
+        </p:spPr>
+        <p:txBody>
+          <a:bodyPr vert="horz" lIns="91440" tIns="45720" rIns="91440" bIns="45720" rtlCol="0"/>
+          <a:lstStyle>
+            <a:lvl1pPr algn="r">
+              <a:defRPr sz="1200"/>
+            </a:lvl1pPr>
+          </a:lstStyle>
+          <a:p>
+            <a:fld id="{67133B79-64F9-47CC-89AE-1B28531A2900}" type="datetimeFigureOut">
+              <a:rPr lang="en-CA" smtClean="0"/>
+              <a:t>30/01/2018</a:t>
+            </a:fld>
+            <a:endParaRPr lang="en-CA"/>
+          </a:p>
+        </p:txBody>
+      </p:sp>
+      <p:sp>
+        <p:nvSpPr>
+          <p:cNvPr id="4" name="Slide Image Placeholder 3"/>
+          <p:cNvSpPr>
+            <a:spLocks noGrp="1" noRot="1" noChangeAspect="1"/>
+          </p:cNvSpPr>
+          <p:nvPr>
+            <p:ph type="sldImg" idx="2"/>
+          </p:nvPr>
+        </p:nvSpPr>
+        <p:spPr>
+          <a:xfrm>
+            <a:off x="685800" y="1143000"/>
+            <a:ext cx="5486400" cy="3086100"/>
+          </a:xfrm>
+          <a:prstGeom prst="rect">
+            <a:avLst/>
+          </a:prstGeom>
+          <a:noFill/>
+          <a:ln w="12700">
+            <a:solidFill>
+              <a:prstClr val="black"/>
+            </a:solidFill>
+          </a:ln>
+        </p:spPr>
+        <p:txBody>
+          <a:bodyPr vert="horz" lIns="91440" tIns="45720" rIns="91440" bIns="45720" rtlCol="0" anchor="ctr"/>
+          <a:lstStyle/>
+          <a:p>
+            <a:endParaRPr lang="en-CA"/>
+          </a:p>
+        </p:txBody>
+      </p:sp>
+      <p:sp>
+        <p:nvSpPr>
+          <p:cNvPr id="5" name="Notes Placeholder 4"/>
+          <p:cNvSpPr>
+            <a:spLocks noGrp="1"/>
+          </p:cNvSpPr>
+          <p:nvPr>
+            <p:ph type="body" sz="quarter" idx="3"/>
+          </p:nvPr>
+        </p:nvSpPr>
+        <p:spPr>
+          <a:xfrm>
+            <a:off x="685800" y="4400550"/>
+            <a:ext cx="5486400" cy="3600450"/>
+          </a:xfrm>
+          <a:prstGeom prst="rect">
+            <a:avLst/>
+          </a:prstGeom>
+        </p:spPr>
+        <p:txBody>
+          <a:bodyPr vert="horz" lIns="91440" tIns="45720" rIns="91440" bIns="45720" rtlCol="0"/>
+          <a:lstStyle/>
+          <a:p>
+            <a:pPr lvl="0"/>
+            <a:r>
+              <a:rPr lang="en-US"/>
+              <a:t>Edit Master text styles</a:t>
+            </a:r>
+          </a:p>
+          <a:p>
+            <a:pPr lvl="1"/>
+            <a:r>
+              <a:rPr lang="en-US"/>
+              <a:t>Second level</a:t>
+            </a:r>
+          </a:p>
+          <a:p>
+            <a:pPr lvl="2"/>
+            <a:r>
+              <a:rPr lang="en-US"/>
+              <a:t>Third level</a:t>
+            </a:r>
+          </a:p>
+          <a:p>
+            <a:pPr lvl="3"/>
+            <a:r>
+              <a:rPr lang="en-US"/>
+              <a:t>Fourth level</a:t>
+            </a:r>
+          </a:p>
+          <a:p>
+            <a:pPr lvl="4"/>
+            <a:r>
+              <a:rPr lang="en-US"/>
+              <a:t>Fifth level</a:t>
+            </a:r>
+            <a:endParaRPr lang="en-CA"/>
+          </a:p>
+        </p:txBody>
+      </p:sp>
+      <p:sp>
+        <p:nvSpPr>
+          <p:cNvPr id="6" name="Footer Placeholder 5"/>
+          <p:cNvSpPr>
+            <a:spLocks noGrp="1"/>
+          </p:cNvSpPr>
+          <p:nvPr>
+            <p:ph type="ftr" sz="quarter" idx="4"/>
+          </p:nvPr>
+        </p:nvSpPr>
+        <p:spPr>
+          <a:xfrm>
+            <a:off x="0" y="8685213"/>
+            <a:ext cx="2971800" cy="458787"/>
+          </a:xfrm>
+          <a:prstGeom prst="rect">
+            <a:avLst/>
+          </a:prstGeom>
+        </p:spPr>
+        <p:txBody>
+          <a:bodyPr vert="horz" lIns="91440" tIns="45720" rIns="91440" bIns="45720" rtlCol="0" anchor="b"/>
+          <a:lstStyle>
+            <a:lvl1pPr algn="l">
+              <a:defRPr sz="1200"/>
+            </a:lvl1pPr>
+          </a:lstStyle>
+          <a:p>
+            <a:endParaRPr lang="en-CA"/>
+          </a:p>
+        </p:txBody>
+      </p:sp>
+      <p:sp>
+        <p:nvSpPr>
+          <p:cNvPr id="7" name="Slide Number Placeholder 6"/>
+          <p:cNvSpPr>
+            <a:spLocks noGrp="1"/>
+          </p:cNvSpPr>
+          <p:nvPr>
+            <p:ph type="sldNum" sz="quarter" idx="5"/>
+          </p:nvPr>
+        </p:nvSpPr>
+        <p:spPr>
+          <a:xfrm>
+            <a:off x="3884613" y="8685213"/>
+            <a:ext cx="2971800" cy="458787"/>
+          </a:xfrm>
+          <a:prstGeom prst="rect">
+            <a:avLst/>
+          </a:prstGeom>
+        </p:spPr>
+        <p:txBody>
+          <a:bodyPr vert="horz" lIns="91440" tIns="45720" rIns="91440" bIns="45720" rtlCol="0" anchor="b"/>
+          <a:lstStyle>
+            <a:lvl1pPr algn="r">
+              <a:defRPr sz="1200"/>
+            </a:lvl1pPr>
+          </a:lstStyle>
+          <a:p>
+            <a:fld id="{D38F2929-972B-4E48-BBBC-55849B7C6403}" type="slidenum">
+              <a:rPr lang="en-CA" smtClean="0"/>
+              <a:t>‹#›</a:t>
+            </a:fld>
+            <a:endParaRPr lang="en-CA"/>
+          </a:p>
+        </p:txBody>
+      </p:sp>
+    </p:spTree>
+    <p:extLst>
+      <p:ext uri="{BB962C8B-B14F-4D97-AF65-F5344CB8AC3E}">
+        <p14:creationId xmlns:p14="http://schemas.microsoft.com/office/powerpoint/2010/main" val="1858392451"/>
+      </p:ext>
+    </p:extLst>
+  </p:cSld>
+  <p:clrMap bg1="lt1" tx1="dk1" bg2="lt2" tx2="dk2" accent1="accent1" accent2="accent2" accent3="accent3" accent4="accent4" accent5="accent5" accent6="accent6" hlink="hlink" folHlink="folHlink"/>
+  <p:notesStyle>
+    <a:lvl1pPr marL="0" algn="l" defTabSz="914400" rtl="0" eaLnBrk="1" latinLnBrk="0" hangingPunct="1">
+      <a:defRPr sz="1200" kern="1200">
+        <a:solidFill>
+          <a:schemeClr val="tx1"/>
+        </a:solidFill>
+        <a:latin typeface="+mn-lt"/>
+        <a:ea typeface="+mn-ea"/>
+        <a:cs typeface="+mn-cs"/>
+      </a:defRPr>
+    </a:lvl1pPr>
+    <a:lvl2pPr marL="457200" algn="l" defTabSz="914400" rtl="0" eaLnBrk="1" latinLnBrk="0" hangingPunct="1">
+      <a:defRPr sz="1200" kern="1200">
+        <a:solidFill>
+          <a:schemeClr val="tx1"/>
+        </a:solidFill>
+        <a:latin typeface="+mn-lt"/>
+        <a:ea typeface="+mn-ea"/>
+        <a:cs typeface="+mn-cs"/>
+      </a:defRPr>
+    </a:lvl2pPr>
+    <a:lvl3pPr marL="914400" algn="l" defTabSz="914400" rtl="0" eaLnBrk="1" latinLnBrk="0" hangingPunct="1">
+      <a:defRPr sz="1200" kern="1200">
+        <a:solidFill>
+          <a:schemeClr val="tx1"/>
+        </a:solidFill>
+        <a:latin typeface="+mn-lt"/>
+        <a:ea typeface="+mn-ea"/>
+        <a:cs typeface="+mn-cs"/>
+      </a:defRPr>
+    </a:lvl3pPr>
+    <a:lvl4pPr marL="1371600" algn="l" defTabSz="914400" rtl="0" eaLnBrk="1" latinLnBrk="0" hangingPunct="1">
+      <a:defRPr sz="1200" kern="1200">
+        <a:solidFill>
+          <a:schemeClr val="tx1"/>
+        </a:solidFill>
+        <a:latin typeface="+mn-lt"/>
+        <a:ea typeface="+mn-ea"/>
+        <a:cs typeface="+mn-cs"/>
+      </a:defRPr>
+    </a:lvl4pPr>
+    <a:lvl5pPr marL="1828800" algn="l" defTabSz="914400" rtl="0" eaLnBrk="1" latinLnBrk="0" hangingPunct="1">
+      <a:defRPr sz="1200" kern="1200">
+        <a:solidFill>
+          <a:schemeClr val="tx1"/>
+        </a:solidFill>
+        <a:latin typeface="+mn-lt"/>
+        <a:ea typeface="+mn-ea"/>
+        <a:cs typeface="+mn-cs"/>
+      </a:defRPr>
+    </a:lvl5pPr>
+    <a:lvl6pPr marL="2286000" algn="l" defTabSz="914400" rtl="0" eaLnBrk="1" latinLnBrk="0" hangingPunct="1">
+      <a:defRPr sz="1200" kern="1200">
+        <a:solidFill>
+          <a:schemeClr val="tx1"/>
+        </a:solidFill>
+        <a:latin typeface="+mn-lt"/>
+        <a:ea typeface="+mn-ea"/>
+        <a:cs typeface="+mn-cs"/>
+      </a:defRPr>
+    </a:lvl6pPr>
+    <a:lvl7pPr marL="2743200" algn="l" defTabSz="914400" rtl="0" eaLnBrk="1" latinLnBrk="0" hangingPunct="1">
+      <a:defRPr sz="1200" kern="1200">
+        <a:solidFill>
+          <a:schemeClr val="tx1"/>
+        </a:solidFill>
+        <a:latin typeface="+mn-lt"/>
+        <a:ea typeface="+mn-ea"/>
+        <a:cs typeface="+mn-cs"/>
+      </a:defRPr>
+    </a:lvl7pPr>
+    <a:lvl8pPr marL="3200400" algn="l" defTabSz="914400" rtl="0" eaLnBrk="1" latinLnBrk="0" hangingPunct="1">
+      <a:defRPr sz="1200" kern="1200">
+        <a:solidFill>
+          <a:schemeClr val="tx1"/>
+        </a:solidFill>
+        <a:latin typeface="+mn-lt"/>
+        <a:ea typeface="+mn-ea"/>
+        <a:cs typeface="+mn-cs"/>
+      </a:defRPr>
+    </a:lvl8pPr>
+    <a:lvl9pPr marL="3657600" algn="l" defTabSz="914400" rtl="0" eaLnBrk="1" latinLnBrk="0" hangingPunct="1">
+      <a:defRPr sz="1200" kern="1200">
+        <a:solidFill>
+          <a:schemeClr val="tx1"/>
+        </a:solidFill>
+        <a:latin typeface="+mn-lt"/>
+        <a:ea typeface="+mn-ea"/>
+        <a:cs typeface="+mn-cs"/>
+      </a:defRPr>
+    </a:lvl9pPr>
+  </p:notesStyle>
+</p:notesMaster>
+</file>
+
+<file path=ppt/notesSlides/notesSlide1.xml><?xml version="1.0" encoding="utf-8"?>
+<p:notes xmlns:a="http://schemas.openxmlformats.org/drawingml/2006/main" xmlns:r="http://schemas.openxmlformats.org/officeDocument/2006/relationships" xmlns:p="http://schemas.openxmlformats.org/presentationml/2006/main">
+  <p:cSld>
+    <p:spTree>
+      <p:nvGrpSpPr>
+        <p:cNvPr id="1" name=""/>
+        <p:cNvGrpSpPr/>
+        <p:nvPr/>
+      </p:nvGrpSpPr>
+      <p:grpSpPr>
+        <a:xfrm>
+          <a:off x="0" y="0"/>
+          <a:ext cx="0" cy="0"/>
+          <a:chOff x="0" y="0"/>
+          <a:chExt cx="0" cy="0"/>
+        </a:xfrm>
+      </p:grpSpPr>
+      <p:sp>
+        <p:nvSpPr>
+          <p:cNvPr id="2" name="Slide Image Placeholder 1"/>
+          <p:cNvSpPr>
+            <a:spLocks noGrp="1" noRot="1" noChangeAspect="1"/>
+          </p:cNvSpPr>
+          <p:nvPr>
+            <p:ph type="sldImg"/>
+          </p:nvPr>
+        </p:nvSpPr>
+        <p:spPr/>
+      </p:sp>
+      <p:sp>
+        <p:nvSpPr>
+          <p:cNvPr id="3" name="Notes Placeholder 2"/>
+          <p:cNvSpPr>
+            <a:spLocks noGrp="1"/>
+          </p:cNvSpPr>
+          <p:nvPr>
+            <p:ph type="body" idx="1"/>
+          </p:nvPr>
+        </p:nvSpPr>
+        <p:spPr/>
+        <p:txBody>
+          <a:bodyPr/>
+          <a:lstStyle/>
+          <a:p>
+            <a:r>
+              <a:rPr lang="en-CA" dirty="0"/>
+              <a:t>Image source: https://commons.wikimedia.org/wiki/File:Beach_Boys_1963.jpg</a:t>
+            </a:r>
+          </a:p>
+        </p:txBody>
+      </p:sp>
+      <p:sp>
+        <p:nvSpPr>
+          <p:cNvPr id="4" name="Slide Number Placeholder 3"/>
+          <p:cNvSpPr>
+            <a:spLocks noGrp="1"/>
+          </p:cNvSpPr>
+          <p:nvPr>
+            <p:ph type="sldNum" sz="quarter" idx="10"/>
+          </p:nvPr>
+        </p:nvSpPr>
+        <p:spPr/>
+        <p:txBody>
+          <a:bodyPr/>
+          <a:lstStyle/>
+          <a:p>
+            <a:fld id="{D38F2929-972B-4E48-BBBC-55849B7C6403}" type="slidenum">
+              <a:rPr lang="en-CA" smtClean="0"/>
+              <a:t>9</a:t>
+            </a:fld>
+            <a:endParaRPr lang="en-CA"/>
+          </a:p>
+        </p:txBody>
+      </p:sp>
+    </p:spTree>
+    <p:extLst>
+      <p:ext uri="{BB962C8B-B14F-4D97-AF65-F5344CB8AC3E}">
+        <p14:creationId xmlns:p14="http://schemas.microsoft.com/office/powerpoint/2010/main" val="1423991167"/>
+      </p:ext>
+    </p:extLst>
+  </p:cSld>
+  <p:clrMapOvr>
+    <a:masterClrMapping/>
+  </p:clrMapOvr>
+</p:notes>
+</file>
+
 <file path=ppt/slideLayouts/slideLayout1.xml><?xml version="1.0" encoding="utf-8"?>
 <p:sldLayout xmlns:a="http://schemas.openxmlformats.org/drawingml/2006/main" xmlns:r="http://schemas.openxmlformats.org/officeDocument/2006/relationships" xmlns:p="http://schemas.openxmlformats.org/presentationml/2006/main" type="title" preserve="1">
   <p:cSld name="Title Slide">
@@ -161,10 +608,9 @@
           </a:lstStyle>
           <a:p>
             <a:r>
-              <a:rPr lang="en-US" smtClean="0"/>
+              <a:rPr lang="en-US"/>
               <a:t>Click to edit Master title style</a:t>
             </a:r>
-            <a:endParaRPr lang="en-US"/>
           </a:p>
         </p:txBody>
       </p:sp>
@@ -226,10 +672,9 @@
           </a:lstStyle>
           <a:p>
             <a:r>
-              <a:rPr lang="en-US" smtClean="0"/>
+              <a:rPr lang="en-US"/>
               <a:t>Click to edit Master subtitle style</a:t>
             </a:r>
-            <a:endParaRPr lang="en-US"/>
           </a:p>
         </p:txBody>
       </p:sp>
@@ -250,7 +695,7 @@
           <a:p>
             <a:fld id="{2EEA8ECE-E1C6-4D1A-8C94-F06283DD1698}" type="datetimeFigureOut">
               <a:rPr lang="en-US" smtClean="0"/>
-              <a:t>10/17/2016</a:t>
+              <a:t>1/30/2018</a:t>
             </a:fld>
             <a:endParaRPr lang="en-US"/>
           </a:p>
@@ -344,10 +789,9 @@
           <a:lstStyle/>
           <a:p>
             <a:r>
-              <a:rPr lang="en-US" smtClean="0"/>
+              <a:rPr lang="en-US"/>
               <a:t>Click to edit Master title style</a:t>
             </a:r>
-            <a:endParaRPr lang="en-US"/>
           </a:p>
         </p:txBody>
       </p:sp>
@@ -368,38 +812,37 @@
           <a:p>
             <a:pPr lvl="0"/>
             <a:r>
-              <a:rPr lang="en-US" smtClean="0"/>
+              <a:rPr lang="en-US"/>
               <a:t>Click to edit Master text styles</a:t>
             </a:r>
           </a:p>
           <a:p>
             <a:pPr lvl="1"/>
             <a:r>
-              <a:rPr lang="en-US" smtClean="0"/>
+              <a:rPr lang="en-US"/>
               <a:t>Second level</a:t>
             </a:r>
           </a:p>
           <a:p>
             <a:pPr lvl="2"/>
             <a:r>
-              <a:rPr lang="en-US" smtClean="0"/>
+              <a:rPr lang="en-US"/>
               <a:t>Third level</a:t>
             </a:r>
           </a:p>
           <a:p>
             <a:pPr lvl="3"/>
             <a:r>
-              <a:rPr lang="en-US" smtClean="0"/>
+              <a:rPr lang="en-US"/>
               <a:t>Fourth level</a:t>
             </a:r>
           </a:p>
           <a:p>
             <a:pPr lvl="4"/>
             <a:r>
-              <a:rPr lang="en-US" smtClean="0"/>
+              <a:rPr lang="en-US"/>
               <a:t>Fifth level</a:t>
             </a:r>
-            <a:endParaRPr lang="en-US"/>
           </a:p>
         </p:txBody>
       </p:sp>
@@ -420,7 +863,7 @@
           <a:p>
             <a:fld id="{2EEA8ECE-E1C6-4D1A-8C94-F06283DD1698}" type="datetimeFigureOut">
               <a:rPr lang="en-US" smtClean="0"/>
-              <a:t>10/17/2016</a:t>
+              <a:t>1/30/2018</a:t>
             </a:fld>
             <a:endParaRPr lang="en-US"/>
           </a:p>
@@ -519,10 +962,9 @@
           <a:lstStyle/>
           <a:p>
             <a:r>
-              <a:rPr lang="en-US" smtClean="0"/>
+              <a:rPr lang="en-US"/>
               <a:t>Click to edit Master title style</a:t>
             </a:r>
-            <a:endParaRPr lang="en-US"/>
           </a:p>
         </p:txBody>
       </p:sp>
@@ -548,38 +990,37 @@
           <a:p>
             <a:pPr lvl="0"/>
             <a:r>
-              <a:rPr lang="en-US" smtClean="0"/>
+              <a:rPr lang="en-US"/>
               <a:t>Click to edit Master text styles</a:t>
             </a:r>
           </a:p>
           <a:p>
             <a:pPr lvl="1"/>
             <a:r>
-              <a:rPr lang="en-US" smtClean="0"/>
+              <a:rPr lang="en-US"/>
               <a:t>Second level</a:t>
             </a:r>
           </a:p>
           <a:p>
             <a:pPr lvl="2"/>
             <a:r>
-              <a:rPr lang="en-US" smtClean="0"/>
+              <a:rPr lang="en-US"/>
               <a:t>Third level</a:t>
             </a:r>
           </a:p>
           <a:p>
             <a:pPr lvl="3"/>
             <a:r>
-              <a:rPr lang="en-US" smtClean="0"/>
+              <a:rPr lang="en-US"/>
               <a:t>Fourth level</a:t>
             </a:r>
           </a:p>
           <a:p>
             <a:pPr lvl="4"/>
             <a:r>
-              <a:rPr lang="en-US" smtClean="0"/>
+              <a:rPr lang="en-US"/>
               <a:t>Fifth level</a:t>
             </a:r>
-            <a:endParaRPr lang="en-US"/>
           </a:p>
         </p:txBody>
       </p:sp>
@@ -600,7 +1041,7 @@
           <a:p>
             <a:fld id="{2EEA8ECE-E1C6-4D1A-8C94-F06283DD1698}" type="datetimeFigureOut">
               <a:rPr lang="en-US" smtClean="0"/>
-              <a:t>10/17/2016</a:t>
+              <a:t>1/30/2018</a:t>
             </a:fld>
             <a:endParaRPr lang="en-US"/>
           </a:p>
@@ -694,10 +1135,9 @@
           <a:lstStyle/>
           <a:p>
             <a:r>
-              <a:rPr lang="en-US" smtClean="0"/>
+              <a:rPr lang="en-US"/>
               <a:t>Click to edit Master title style</a:t>
             </a:r>
-            <a:endParaRPr lang="en-US"/>
           </a:p>
         </p:txBody>
       </p:sp>
@@ -718,38 +1158,37 @@
           <a:p>
             <a:pPr lvl="0"/>
             <a:r>
-              <a:rPr lang="en-US" smtClean="0"/>
+              <a:rPr lang="en-US"/>
               <a:t>Click to edit Master text styles</a:t>
             </a:r>
           </a:p>
           <a:p>
             <a:pPr lvl="1"/>
             <a:r>
-              <a:rPr lang="en-US" smtClean="0"/>
+              <a:rPr lang="en-US"/>
               <a:t>Second level</a:t>
             </a:r>
           </a:p>
           <a:p>
             <a:pPr lvl="2"/>
             <a:r>
-              <a:rPr lang="en-US" smtClean="0"/>
+              <a:rPr lang="en-US"/>
               <a:t>Third level</a:t>
             </a:r>
           </a:p>
           <a:p>
             <a:pPr lvl="3"/>
             <a:r>
-              <a:rPr lang="en-US" smtClean="0"/>
+              <a:rPr lang="en-US"/>
               <a:t>Fourth level</a:t>
             </a:r>
           </a:p>
           <a:p>
             <a:pPr lvl="4"/>
             <a:r>
-              <a:rPr lang="en-US" smtClean="0"/>
+              <a:rPr lang="en-US"/>
               <a:t>Fifth level</a:t>
             </a:r>
-            <a:endParaRPr lang="en-US"/>
           </a:p>
         </p:txBody>
       </p:sp>
@@ -770,7 +1209,7 @@
           <a:p>
             <a:fld id="{2EEA8ECE-E1C6-4D1A-8C94-F06283DD1698}" type="datetimeFigureOut">
               <a:rPr lang="en-US" smtClean="0"/>
-              <a:t>10/17/2016</a:t>
+              <a:t>1/30/2018</a:t>
             </a:fld>
             <a:endParaRPr lang="en-US"/>
           </a:p>
@@ -873,10 +1312,9 @@
           </a:lstStyle>
           <a:p>
             <a:r>
-              <a:rPr lang="en-US" smtClean="0"/>
+              <a:rPr lang="en-US"/>
               <a:t>Click to edit Master title style</a:t>
             </a:r>
-            <a:endParaRPr lang="en-US"/>
           </a:p>
         </p:txBody>
       </p:sp>
@@ -993,7 +1431,7 @@
           <a:p>
             <a:pPr lvl="0"/>
             <a:r>
-              <a:rPr lang="en-US" smtClean="0"/>
+              <a:rPr lang="en-US"/>
               <a:t>Click to edit Master text styles</a:t>
             </a:r>
           </a:p>
@@ -1016,7 +1454,7 @@
           <a:p>
             <a:fld id="{2EEA8ECE-E1C6-4D1A-8C94-F06283DD1698}" type="datetimeFigureOut">
               <a:rPr lang="en-US" smtClean="0"/>
-              <a:t>10/17/2016</a:t>
+              <a:t>1/30/2018</a:t>
             </a:fld>
             <a:endParaRPr lang="en-US"/>
           </a:p>
@@ -1110,10 +1548,9 @@
           <a:lstStyle/>
           <a:p>
             <a:r>
-              <a:rPr lang="en-US" smtClean="0"/>
+              <a:rPr lang="en-US"/>
               <a:t>Click to edit Master title style</a:t>
             </a:r>
-            <a:endParaRPr lang="en-US"/>
           </a:p>
         </p:txBody>
       </p:sp>
@@ -1139,38 +1576,37 @@
           <a:p>
             <a:pPr lvl="0"/>
             <a:r>
-              <a:rPr lang="en-US" smtClean="0"/>
+              <a:rPr lang="en-US"/>
               <a:t>Click to edit Master text styles</a:t>
             </a:r>
           </a:p>
           <a:p>
             <a:pPr lvl="1"/>
             <a:r>
-              <a:rPr lang="en-US" smtClean="0"/>
+              <a:rPr lang="en-US"/>
               <a:t>Second level</a:t>
             </a:r>
           </a:p>
           <a:p>
             <a:pPr lvl="2"/>
             <a:r>
-              <a:rPr lang="en-US" smtClean="0"/>
+              <a:rPr lang="en-US"/>
               <a:t>Third level</a:t>
             </a:r>
           </a:p>
           <a:p>
             <a:pPr lvl="3"/>
             <a:r>
-              <a:rPr lang="en-US" smtClean="0"/>
+              <a:rPr lang="en-US"/>
               <a:t>Fourth level</a:t>
             </a:r>
           </a:p>
           <a:p>
             <a:pPr lvl="4"/>
             <a:r>
-              <a:rPr lang="en-US" smtClean="0"/>
+              <a:rPr lang="en-US"/>
               <a:t>Fifth level</a:t>
             </a:r>
-            <a:endParaRPr lang="en-US"/>
           </a:p>
         </p:txBody>
       </p:sp>
@@ -1196,38 +1632,37 @@
           <a:p>
             <a:pPr lvl="0"/>
             <a:r>
-              <a:rPr lang="en-US" smtClean="0"/>
+              <a:rPr lang="en-US"/>
               <a:t>Click to edit Master text styles</a:t>
             </a:r>
           </a:p>
           <a:p>
             <a:pPr lvl="1"/>
             <a:r>
-              <a:rPr lang="en-US" smtClean="0"/>
+              <a:rPr lang="en-US"/>
               <a:t>Second level</a:t>
             </a:r>
           </a:p>
           <a:p>
             <a:pPr lvl="2"/>
             <a:r>
-              <a:rPr lang="en-US" smtClean="0"/>
+              <a:rPr lang="en-US"/>
               <a:t>Third level</a:t>
             </a:r>
           </a:p>
           <a:p>
             <a:pPr lvl="3"/>
             <a:r>
-              <a:rPr lang="en-US" smtClean="0"/>
+              <a:rPr lang="en-US"/>
               <a:t>Fourth level</a:t>
             </a:r>
           </a:p>
           <a:p>
             <a:pPr lvl="4"/>
             <a:r>
-              <a:rPr lang="en-US" smtClean="0"/>
+              <a:rPr lang="en-US"/>
               <a:t>Fifth level</a:t>
             </a:r>
-            <a:endParaRPr lang="en-US"/>
           </a:p>
         </p:txBody>
       </p:sp>
@@ -1248,7 +1683,7 @@
           <a:p>
             <a:fld id="{2EEA8ECE-E1C6-4D1A-8C94-F06283DD1698}" type="datetimeFigureOut">
               <a:rPr lang="en-US" smtClean="0"/>
-              <a:t>10/17/2016</a:t>
+              <a:t>1/30/2018</a:t>
             </a:fld>
             <a:endParaRPr lang="en-US"/>
           </a:p>
@@ -1347,10 +1782,9 @@
           <a:lstStyle/>
           <a:p>
             <a:r>
-              <a:rPr lang="en-US" smtClean="0"/>
+              <a:rPr lang="en-US"/>
               <a:t>Click to edit Master title style</a:t>
             </a:r>
-            <a:endParaRPr lang="en-US"/>
           </a:p>
         </p:txBody>
       </p:sp>
@@ -1413,7 +1847,7 @@
           <a:p>
             <a:pPr lvl="0"/>
             <a:r>
-              <a:rPr lang="en-US" smtClean="0"/>
+              <a:rPr lang="en-US"/>
               <a:t>Click to edit Master text styles</a:t>
             </a:r>
           </a:p>
@@ -1441,38 +1875,37 @@
           <a:p>
             <a:pPr lvl="0"/>
             <a:r>
-              <a:rPr lang="en-US" smtClean="0"/>
+              <a:rPr lang="en-US"/>
               <a:t>Click to edit Master text styles</a:t>
             </a:r>
           </a:p>
           <a:p>
             <a:pPr lvl="1"/>
             <a:r>
-              <a:rPr lang="en-US" smtClean="0"/>
+              <a:rPr lang="en-US"/>
               <a:t>Second level</a:t>
             </a:r>
           </a:p>
           <a:p>
             <a:pPr lvl="2"/>
             <a:r>
-              <a:rPr lang="en-US" smtClean="0"/>
+              <a:rPr lang="en-US"/>
               <a:t>Third level</a:t>
             </a:r>
           </a:p>
           <a:p>
             <a:pPr lvl="3"/>
             <a:r>
-              <a:rPr lang="en-US" smtClean="0"/>
+              <a:rPr lang="en-US"/>
               <a:t>Fourth level</a:t>
             </a:r>
           </a:p>
           <a:p>
             <a:pPr lvl="4"/>
             <a:r>
-              <a:rPr lang="en-US" smtClean="0"/>
+              <a:rPr lang="en-US"/>
               <a:t>Fifth level</a:t>
             </a:r>
-            <a:endParaRPr lang="en-US"/>
           </a:p>
         </p:txBody>
       </p:sp>
@@ -1535,7 +1968,7 @@
           <a:p>
             <a:pPr lvl="0"/>
             <a:r>
-              <a:rPr lang="en-US" smtClean="0"/>
+              <a:rPr lang="en-US"/>
               <a:t>Click to edit Master text styles</a:t>
             </a:r>
           </a:p>
@@ -1563,38 +1996,37 @@
           <a:p>
             <a:pPr lvl="0"/>
             <a:r>
-              <a:rPr lang="en-US" smtClean="0"/>
+              <a:rPr lang="en-US"/>
               <a:t>Click to edit Master text styles</a:t>
             </a:r>
           </a:p>
           <a:p>
             <a:pPr lvl="1"/>
             <a:r>
-              <a:rPr lang="en-US" smtClean="0"/>
+              <a:rPr lang="en-US"/>
               <a:t>Second level</a:t>
             </a:r>
           </a:p>
           <a:p>
             <a:pPr lvl="2"/>
             <a:r>
-              <a:rPr lang="en-US" smtClean="0"/>
+              <a:rPr lang="en-US"/>
               <a:t>Third level</a:t>
             </a:r>
           </a:p>
           <a:p>
             <a:pPr lvl="3"/>
             <a:r>
-              <a:rPr lang="en-US" smtClean="0"/>
+              <a:rPr lang="en-US"/>
               <a:t>Fourth level</a:t>
             </a:r>
           </a:p>
           <a:p>
             <a:pPr lvl="4"/>
             <a:r>
-              <a:rPr lang="en-US" smtClean="0"/>
+              <a:rPr lang="en-US"/>
               <a:t>Fifth level</a:t>
             </a:r>
-            <a:endParaRPr lang="en-US"/>
           </a:p>
         </p:txBody>
       </p:sp>
@@ -1615,7 +2047,7 @@
           <a:p>
             <a:fld id="{2EEA8ECE-E1C6-4D1A-8C94-F06283DD1698}" type="datetimeFigureOut">
               <a:rPr lang="en-US" smtClean="0"/>
-              <a:t>10/17/2016</a:t>
+              <a:t>1/30/2018</a:t>
             </a:fld>
             <a:endParaRPr lang="en-US"/>
           </a:p>
@@ -1709,10 +2141,9 @@
           <a:lstStyle/>
           <a:p>
             <a:r>
-              <a:rPr lang="en-US" smtClean="0"/>
+              <a:rPr lang="en-US"/>
               <a:t>Click to edit Master title style</a:t>
             </a:r>
-            <a:endParaRPr lang="en-US"/>
           </a:p>
         </p:txBody>
       </p:sp>
@@ -1733,7 +2164,7 @@
           <a:p>
             <a:fld id="{2EEA8ECE-E1C6-4D1A-8C94-F06283DD1698}" type="datetimeFigureOut">
               <a:rPr lang="en-US" smtClean="0"/>
-              <a:t>10/17/2016</a:t>
+              <a:t>1/30/2018</a:t>
             </a:fld>
             <a:endParaRPr lang="en-US"/>
           </a:p>
@@ -1828,7 +2259,7 @@
           <a:p>
             <a:fld id="{2EEA8ECE-E1C6-4D1A-8C94-F06283DD1698}" type="datetimeFigureOut">
               <a:rPr lang="en-US" smtClean="0"/>
-              <a:t>10/17/2016</a:t>
+              <a:t>1/30/2018</a:t>
             </a:fld>
             <a:endParaRPr lang="en-US"/>
           </a:p>
@@ -1931,10 +2362,9 @@
           </a:lstStyle>
           <a:p>
             <a:r>
-              <a:rPr lang="en-US" smtClean="0"/>
+              <a:rPr lang="en-US"/>
               <a:t>Click to edit Master title style</a:t>
             </a:r>
-            <a:endParaRPr lang="en-US"/>
           </a:p>
         </p:txBody>
       </p:sp>
@@ -1988,38 +2418,37 @@
           <a:p>
             <a:pPr lvl="0"/>
             <a:r>
-              <a:rPr lang="en-US" smtClean="0"/>
+              <a:rPr lang="en-US"/>
               <a:t>Click to edit Master text styles</a:t>
             </a:r>
           </a:p>
           <a:p>
             <a:pPr lvl="1"/>
             <a:r>
-              <a:rPr lang="en-US" smtClean="0"/>
+              <a:rPr lang="en-US"/>
               <a:t>Second level</a:t>
             </a:r>
           </a:p>
           <a:p>
             <a:pPr lvl="2"/>
             <a:r>
-              <a:rPr lang="en-US" smtClean="0"/>
+              <a:rPr lang="en-US"/>
               <a:t>Third level</a:t>
             </a:r>
           </a:p>
           <a:p>
             <a:pPr lvl="3"/>
             <a:r>
-              <a:rPr lang="en-US" smtClean="0"/>
+              <a:rPr lang="en-US"/>
               <a:t>Fourth level</a:t>
             </a:r>
           </a:p>
           <a:p>
             <a:pPr lvl="4"/>
             <a:r>
-              <a:rPr lang="en-US" smtClean="0"/>
+              <a:rPr lang="en-US"/>
               <a:t>Fifth level</a:t>
             </a:r>
-            <a:endParaRPr lang="en-US"/>
           </a:p>
         </p:txBody>
       </p:sp>
@@ -2082,7 +2511,7 @@
           <a:p>
             <a:pPr lvl="0"/>
             <a:r>
-              <a:rPr lang="en-US" smtClean="0"/>
+              <a:rPr lang="en-US"/>
               <a:t>Click to edit Master text styles</a:t>
             </a:r>
           </a:p>
@@ -2105,7 +2534,7 @@
           <a:p>
             <a:fld id="{2EEA8ECE-E1C6-4D1A-8C94-F06283DD1698}" type="datetimeFigureOut">
               <a:rPr lang="en-US" smtClean="0"/>
-              <a:t>10/17/2016</a:t>
+              <a:t>1/30/2018</a:t>
             </a:fld>
             <a:endParaRPr lang="en-US"/>
           </a:p>
@@ -2208,10 +2637,9 @@
           </a:lstStyle>
           <a:p>
             <a:r>
-              <a:rPr lang="en-US" smtClean="0"/>
+              <a:rPr lang="en-US"/>
               <a:t>Click to edit Master title style</a:t>
             </a:r>
-            <a:endParaRPr lang="en-US"/>
           </a:p>
         </p:txBody>
       </p:sp>
@@ -2335,7 +2763,7 @@
           <a:p>
             <a:pPr lvl="0"/>
             <a:r>
-              <a:rPr lang="en-US" smtClean="0"/>
+              <a:rPr lang="en-US"/>
               <a:t>Click to edit Master text styles</a:t>
             </a:r>
           </a:p>
@@ -2358,7 +2786,7 @@
           <a:p>
             <a:fld id="{2EEA8ECE-E1C6-4D1A-8C94-F06283DD1698}" type="datetimeFigureOut">
               <a:rPr lang="en-US" smtClean="0"/>
-              <a:t>10/17/2016</a:t>
+              <a:t>1/30/2018</a:t>
             </a:fld>
             <a:endParaRPr lang="en-US"/>
           </a:p>
@@ -2477,10 +2905,9 @@
           <a:lstStyle/>
           <a:p>
             <a:r>
-              <a:rPr lang="en-US" smtClean="0"/>
+              <a:rPr lang="en-US"/>
               <a:t>Click to edit Master title style</a:t>
             </a:r>
-            <a:endParaRPr lang="en-US"/>
           </a:p>
         </p:txBody>
       </p:sp>
@@ -2511,38 +2938,37 @@
           <a:p>
             <a:pPr lvl="0"/>
             <a:r>
-              <a:rPr lang="en-US" smtClean="0"/>
+              <a:rPr lang="en-US"/>
               <a:t>Click to edit Master text styles</a:t>
             </a:r>
           </a:p>
           <a:p>
             <a:pPr lvl="1"/>
             <a:r>
-              <a:rPr lang="en-US" smtClean="0"/>
+              <a:rPr lang="en-US"/>
               <a:t>Second level</a:t>
             </a:r>
           </a:p>
           <a:p>
             <a:pPr lvl="2"/>
             <a:r>
-              <a:rPr lang="en-US" smtClean="0"/>
+              <a:rPr lang="en-US"/>
               <a:t>Third level</a:t>
             </a:r>
           </a:p>
           <a:p>
             <a:pPr lvl="3"/>
             <a:r>
-              <a:rPr lang="en-US" smtClean="0"/>
+              <a:rPr lang="en-US"/>
               <a:t>Fourth level</a:t>
             </a:r>
           </a:p>
           <a:p>
             <a:pPr lvl="4"/>
             <a:r>
-              <a:rPr lang="en-US" smtClean="0"/>
+              <a:rPr lang="en-US"/>
               <a:t>Fifth level</a:t>
             </a:r>
-            <a:endParaRPr lang="en-US"/>
           </a:p>
         </p:txBody>
       </p:sp>
@@ -2581,7 +3007,7 @@
           <a:p>
             <a:fld id="{2EEA8ECE-E1C6-4D1A-8C94-F06283DD1698}" type="datetimeFigureOut">
               <a:rPr lang="en-US" smtClean="0"/>
-              <a:t>10/17/2016</a:t>
+              <a:t>1/30/2018</a:t>
             </a:fld>
             <a:endParaRPr lang="en-US"/>
           </a:p>
@@ -3030,13 +3456,332 @@
   <p:clrMapOvr>
     <a:masterClrMapping/>
   </p:clrMapOvr>
-  <p:timing>
-    <p:tnLst>
-      <p:par>
-        <p:cTn id="1" dur="indefinite" restart="never" nodeType="tmRoot"/>
-      </p:par>
-    </p:tnLst>
-  </p:timing>
+</p:sld>
+</file>
+
+<file path=ppt/slides/slide10.xml><?xml version="1.0" encoding="utf-8"?>
+<p:sld xmlns:a="http://schemas.openxmlformats.org/drawingml/2006/main" xmlns:r="http://schemas.openxmlformats.org/officeDocument/2006/relationships" xmlns:p="http://schemas.openxmlformats.org/presentationml/2006/main">
+  <p:cSld>
+    <p:spTree>
+      <p:nvGrpSpPr>
+        <p:cNvPr id="1" name=""/>
+        <p:cNvGrpSpPr/>
+        <p:nvPr/>
+      </p:nvGrpSpPr>
+      <p:grpSpPr>
+        <a:xfrm>
+          <a:off x="0" y="0"/>
+          <a:ext cx="0" cy="0"/>
+          <a:chOff x="0" y="0"/>
+          <a:chExt cx="0" cy="0"/>
+        </a:xfrm>
+      </p:grpSpPr>
+      <p:sp>
+        <p:nvSpPr>
+          <p:cNvPr id="2" name="Title 1"/>
+          <p:cNvSpPr>
+            <a:spLocks noGrp="1"/>
+          </p:cNvSpPr>
+          <p:nvPr>
+            <p:ph type="title"/>
+          </p:nvPr>
+        </p:nvSpPr>
+        <p:spPr>
+          <a:xfrm>
+            <a:off x="838200" y="233265"/>
+            <a:ext cx="10515600" cy="1194319"/>
+          </a:xfrm>
+        </p:spPr>
+        <p:txBody>
+          <a:bodyPr>
+            <a:normAutofit/>
+          </a:bodyPr>
+          <a:lstStyle/>
+          <a:p>
+            <a:pPr algn="ctr"/>
+            <a:r>
+              <a:rPr lang="en-US" sz="7200" b="1" dirty="0"/>
+              <a:t>The Beach Boys, 1965</a:t>
+            </a:r>
+          </a:p>
+        </p:txBody>
+      </p:sp>
+      <p:pic>
+        <p:nvPicPr>
+          <p:cNvPr id="4" name="Content Placeholder 3"/>
+          <p:cNvPicPr>
+            <a:picLocks noGrp="1" noChangeAspect="1"/>
+          </p:cNvPicPr>
+          <p:nvPr>
+            <p:ph idx="1"/>
+          </p:nvPr>
+        </p:nvPicPr>
+        <p:blipFill>
+          <a:blip r:embed="rId2">
+            <a:extLst>
+              <a:ext uri="{28A0092B-C50C-407E-A947-70E740481C1C}">
+                <a14:useLocalDpi xmlns:a14="http://schemas.microsoft.com/office/drawing/2010/main" val="0"/>
+              </a:ext>
+            </a:extLst>
+          </a:blip>
+          <a:stretch>
+            <a:fillRect/>
+          </a:stretch>
+        </p:blipFill>
+        <p:spPr>
+          <a:xfrm>
+            <a:off x="2876282" y="1503653"/>
+            <a:ext cx="6439436" cy="5031820"/>
+          </a:xfrm>
+          <a:prstGeom prst="rect">
+            <a:avLst/>
+          </a:prstGeom>
+          <a:ln>
+            <a:noFill/>
+          </a:ln>
+          <a:effectLst>
+            <a:outerShdw blurRad="292100" dist="139700" dir="2700000" algn="tl" rotWithShape="0">
+              <a:srgbClr val="333333">
+                <a:alpha val="65000"/>
+              </a:srgbClr>
+            </a:outerShdw>
+          </a:effectLst>
+        </p:spPr>
+      </p:pic>
+    </p:spTree>
+    <p:extLst>
+      <p:ext uri="{BB962C8B-B14F-4D97-AF65-F5344CB8AC3E}">
+        <p14:creationId xmlns:p14="http://schemas.microsoft.com/office/powerpoint/2010/main" val="25515357"/>
+      </p:ext>
+    </p:extLst>
+  </p:cSld>
+  <p:clrMapOvr>
+    <a:masterClrMapping/>
+  </p:clrMapOvr>
+</p:sld>
+</file>
+
+<file path=ppt/slides/slide11.xml><?xml version="1.0" encoding="utf-8"?>
+<p:sld xmlns:a="http://schemas.openxmlformats.org/drawingml/2006/main" xmlns:r="http://schemas.openxmlformats.org/officeDocument/2006/relationships" xmlns:p="http://schemas.openxmlformats.org/presentationml/2006/main">
+  <p:cSld>
+    <p:spTree>
+      <p:nvGrpSpPr>
+        <p:cNvPr id="1" name=""/>
+        <p:cNvGrpSpPr/>
+        <p:nvPr/>
+      </p:nvGrpSpPr>
+      <p:grpSpPr>
+        <a:xfrm>
+          <a:off x="0" y="0"/>
+          <a:ext cx="0" cy="0"/>
+          <a:chOff x="0" y="0"/>
+          <a:chExt cx="0" cy="0"/>
+        </a:xfrm>
+      </p:grpSpPr>
+      <p:sp>
+        <p:nvSpPr>
+          <p:cNvPr id="2" name="Title 1"/>
+          <p:cNvSpPr>
+            <a:spLocks noGrp="1"/>
+          </p:cNvSpPr>
+          <p:nvPr>
+            <p:ph type="title"/>
+          </p:nvPr>
+        </p:nvSpPr>
+        <p:spPr>
+          <a:xfrm>
+            <a:off x="838200" y="243827"/>
+            <a:ext cx="10515600" cy="913169"/>
+          </a:xfrm>
+        </p:spPr>
+        <p:txBody>
+          <a:bodyPr>
+            <a:normAutofit fontScale="90000"/>
+          </a:bodyPr>
+          <a:lstStyle/>
+          <a:p>
+            <a:r>
+              <a:rPr lang="en-US" sz="7200" b="1" dirty="0"/>
+              <a:t>“Pet Sounds”, 1966 </a:t>
+            </a:r>
+          </a:p>
+        </p:txBody>
+      </p:sp>
+      <p:pic>
+        <p:nvPicPr>
+          <p:cNvPr id="4" name="Content Placeholder 3"/>
+          <p:cNvPicPr>
+            <a:picLocks noGrp="1" noChangeAspect="1"/>
+          </p:cNvPicPr>
+          <p:nvPr>
+            <p:ph idx="1"/>
+          </p:nvPr>
+        </p:nvPicPr>
+        <p:blipFill>
+          <a:blip r:embed="rId2" cstate="print">
+            <a:extLst>
+              <a:ext uri="{28A0092B-C50C-407E-A947-70E740481C1C}">
+                <a14:useLocalDpi xmlns:a14="http://schemas.microsoft.com/office/drawing/2010/main" val="0"/>
+              </a:ext>
+            </a:extLst>
+          </a:blip>
+          <a:stretch>
+            <a:fillRect/>
+          </a:stretch>
+        </p:blipFill>
+        <p:spPr>
+          <a:xfrm>
+            <a:off x="7677916" y="1690688"/>
+            <a:ext cx="4017334" cy="4017334"/>
+          </a:xfrm>
+          <a:prstGeom prst="rect">
+            <a:avLst/>
+          </a:prstGeom>
+          <a:ln>
+            <a:noFill/>
+          </a:ln>
+          <a:effectLst>
+            <a:outerShdw blurRad="292100" dist="139700" dir="2700000" algn="tl" rotWithShape="0">
+              <a:srgbClr val="333333">
+                <a:alpha val="65000"/>
+              </a:srgbClr>
+            </a:outerShdw>
+          </a:effectLst>
+        </p:spPr>
+      </p:pic>
+      <p:sp>
+        <p:nvSpPr>
+          <p:cNvPr id="5" name="TextBox 4"/>
+          <p:cNvSpPr txBox="1"/>
+          <p:nvPr/>
+        </p:nvSpPr>
+        <p:spPr>
+          <a:xfrm>
+            <a:off x="336163" y="1156996"/>
+            <a:ext cx="7076314" cy="4832092"/>
+          </a:xfrm>
+          <a:prstGeom prst="rect">
+            <a:avLst/>
+          </a:prstGeom>
+          <a:noFill/>
+        </p:spPr>
+        <p:txBody>
+          <a:bodyPr wrap="square" rtlCol="0">
+            <a:spAutoFit/>
+          </a:bodyPr>
+          <a:lstStyle/>
+          <a:p>
+            <a:pPr marL="285750" indent="-285750">
+              <a:buFont typeface="Arial" panose="020B0604020202020204" pitchFamily="34" charset="0"/>
+              <a:buChar char="•"/>
+            </a:pPr>
+            <a:r>
+              <a:rPr lang="en-US" sz="2800" dirty="0"/>
+              <a:t>Brian Wilson’s project [</a:t>
+            </a:r>
+            <a:r>
+              <a:rPr lang="en-US" sz="2800" dirty="0">
+                <a:hlinkClick r:id="rId3"/>
+              </a:rPr>
+              <a:t>link</a:t>
+            </a:r>
+            <a:r>
+              <a:rPr lang="en-US" sz="2800" dirty="0"/>
+              <a:t>]</a:t>
+            </a:r>
+          </a:p>
+          <a:p>
+            <a:pPr marL="285750" indent="-285750">
+              <a:buFont typeface="Arial" panose="020B0604020202020204" pitchFamily="34" charset="0"/>
+              <a:buChar char="•"/>
+            </a:pPr>
+            <a:r>
+              <a:rPr lang="en-US" sz="2800" dirty="0"/>
+              <a:t>The Beatles’ “Rubber Soul” (1965)</a:t>
+            </a:r>
+          </a:p>
+          <a:p>
+            <a:pPr marL="285750" indent="-285750">
+              <a:buFont typeface="Arial" panose="020B0604020202020204" pitchFamily="34" charset="0"/>
+              <a:buChar char="•"/>
+            </a:pPr>
+            <a:r>
+              <a:rPr lang="en-US" sz="2800" dirty="0"/>
+              <a:t>Worked with lyricist Tony Asher.</a:t>
+            </a:r>
+          </a:p>
+          <a:p>
+            <a:pPr marL="285750" indent="-285750">
+              <a:buFont typeface="Arial" panose="020B0604020202020204" pitchFamily="34" charset="0"/>
+              <a:buChar char="•"/>
+            </a:pPr>
+            <a:r>
+              <a:rPr lang="en-US" sz="2800" dirty="0"/>
+              <a:t>Stopped touring.</a:t>
+            </a:r>
+          </a:p>
+          <a:p>
+            <a:pPr marL="285750" indent="-285750">
+              <a:buFont typeface="Arial" panose="020B0604020202020204" pitchFamily="34" charset="0"/>
+              <a:buChar char="•"/>
+            </a:pPr>
+            <a:r>
+              <a:rPr lang="en-US" sz="2800" dirty="0"/>
+              <a:t>Focused on recording (marijuana).</a:t>
+            </a:r>
+          </a:p>
+          <a:p>
+            <a:pPr marL="285750" indent="-285750">
+              <a:buFont typeface="Arial" panose="020B0604020202020204" pitchFamily="34" charset="0"/>
+              <a:buChar char="•"/>
+            </a:pPr>
+            <a:r>
+              <a:rPr lang="en-US" sz="2800" dirty="0"/>
+              <a:t>First rock concept album, rock was not only for dancing (earphones in the dark).</a:t>
+            </a:r>
+          </a:p>
+          <a:p>
+            <a:pPr marL="285750" indent="-285750">
+              <a:buFont typeface="Arial" panose="020B0604020202020204" pitchFamily="34" charset="0"/>
+              <a:buChar char="•"/>
+            </a:pPr>
+            <a:r>
+              <a:rPr lang="en-US" sz="2800" dirty="0"/>
+              <a:t>Initially, not well received in USA (peaked at no. 10), though embraced in the UK (no. 2).</a:t>
+            </a:r>
+          </a:p>
+          <a:p>
+            <a:pPr marL="285750" indent="-285750">
+              <a:buFont typeface="Arial" panose="020B0604020202020204" pitchFamily="34" charset="0"/>
+              <a:buChar char="•"/>
+            </a:pPr>
+            <a:r>
+              <a:rPr lang="en-US" sz="2800" dirty="0"/>
+              <a:t>Single: “Wouldn’t it be nice”</a:t>
+            </a:r>
+          </a:p>
+          <a:p>
+            <a:pPr marL="285750" indent="-285750">
+              <a:buFont typeface="Arial" panose="020B0604020202020204" pitchFamily="34" charset="0"/>
+              <a:buChar char="•"/>
+            </a:pPr>
+            <a:r>
+              <a:rPr lang="en-US" sz="2800" dirty="0"/>
+              <a:t>Not very popular then, but very influential.</a:t>
+            </a:r>
+          </a:p>
+        </p:txBody>
+      </p:sp>
+    </p:spTree>
+    <p:extLst>
+      <p:ext uri="{BB962C8B-B14F-4D97-AF65-F5344CB8AC3E}">
+        <p14:creationId xmlns:p14="http://schemas.microsoft.com/office/powerpoint/2010/main" val="426149005"/>
+      </p:ext>
+    </p:extLst>
+  </p:cSld>
+  <p:clrMapOvr>
+    <a:masterClrMapping/>
+  </p:clrMapOvr>
 </p:sld>
 </file>
 
@@ -3081,11 +3826,58 @@
         </p:blipFill>
         <p:spPr>
           <a:xfrm>
-            <a:off x="2602523" y="142056"/>
+            <a:off x="462438" y="200464"/>
             <a:ext cx="6457071" cy="6457071"/>
           </a:xfrm>
         </p:spPr>
       </p:pic>
+      <p:sp>
+        <p:nvSpPr>
+          <p:cNvPr id="2" name="TextBox 1">
+            <a:extLst>
+              <a:ext uri="{FF2B5EF4-FFF2-40B4-BE49-F238E27FC236}">
+                <a16:creationId xmlns:a16="http://schemas.microsoft.com/office/drawing/2014/main" id="{8491E059-86AF-42E0-A952-729F4219E748}"/>
+              </a:ext>
+            </a:extLst>
+          </p:cNvPr>
+          <p:cNvSpPr txBox="1"/>
+          <p:nvPr/>
+        </p:nvSpPr>
+        <p:spPr>
+          <a:xfrm>
+            <a:off x="7422204" y="963038"/>
+            <a:ext cx="4474724" cy="1815882"/>
+          </a:xfrm>
+          <a:prstGeom prst="rect">
+            <a:avLst/>
+          </a:prstGeom>
+          <a:noFill/>
+        </p:spPr>
+        <p:txBody>
+          <a:bodyPr wrap="square" rtlCol="0">
+            <a:spAutoFit/>
+          </a:bodyPr>
+          <a:lstStyle/>
+          <a:p>
+            <a:r>
+              <a:rPr lang="en-CA" sz="2800" b="1" dirty="0"/>
+              <a:t>1940 pop.: 7 million</a:t>
+            </a:r>
+          </a:p>
+          <a:p>
+            <a:r>
+              <a:rPr lang="en-CA" sz="2800" b="1" dirty="0"/>
+              <a:t>1950 pop.: 10.6 million</a:t>
+            </a:r>
+          </a:p>
+          <a:p>
+            <a:r>
+              <a:rPr lang="en-CA" sz="2800" b="1" dirty="0"/>
+              <a:t>1962 pop. 17 million, pop. (expanding 1700 per day)</a:t>
+            </a:r>
+          </a:p>
+        </p:txBody>
+      </p:sp>
     </p:spTree>
     <p:extLst>
       <p:ext uri="{BB962C8B-B14F-4D97-AF65-F5344CB8AC3E}">
@@ -3096,13 +3888,6 @@
   <p:clrMapOvr>
     <a:masterClrMapping/>
   </p:clrMapOvr>
-  <p:timing>
-    <p:tnLst>
-      <p:par>
-        <p:cTn id="1" dur="indefinite" restart="never" nodeType="tmRoot"/>
-      </p:par>
-    </p:tnLst>
-  </p:timing>
 </p:sld>
 </file>
 
@@ -3139,14 +3924,11 @@
           <a:lstStyle/>
           <a:p>
             <a:r>
-              <a:rPr lang="en-US" b="1" dirty="0" smtClean="0">
+              <a:rPr lang="en-US" b="1" dirty="0">
                 <a:latin typeface="Copperplate Gothic Bold" panose="020E0705020206020404" pitchFamily="34" charset="0"/>
               </a:rPr>
               <a:t>California, another nation?</a:t>
             </a:r>
-            <a:endParaRPr lang="en-US" b="1" dirty="0">
-              <a:latin typeface="Copperplate Gothic Bold" panose="020E0705020206020404" pitchFamily="34" charset="0"/>
-            </a:endParaRPr>
           </a:p>
         </p:txBody>
       </p:sp>
@@ -3166,43 +3948,43 @@
           <a:lstStyle/>
           <a:p>
             <a:r>
-              <a:rPr lang="en-US" dirty="0" smtClean="0"/>
+              <a:rPr lang="en-US" dirty="0"/>
               <a:t>Huge</a:t>
             </a:r>
           </a:p>
           <a:p>
             <a:r>
-              <a:rPr lang="en-US" dirty="0" smtClean="0"/>
+              <a:rPr lang="en-US" dirty="0"/>
               <a:t>Resource rich: gold, oil, minerals, agriculture, tourism</a:t>
             </a:r>
           </a:p>
           <a:p>
             <a:r>
-              <a:rPr lang="en-US" dirty="0" smtClean="0"/>
+              <a:rPr lang="en-US" dirty="0"/>
               <a:t>Distant from the eastern seaboard</a:t>
             </a:r>
           </a:p>
           <a:p>
             <a:r>
-              <a:rPr lang="en-US" dirty="0" smtClean="0"/>
+              <a:rPr lang="en-US" dirty="0"/>
               <a:t>Beaches</a:t>
             </a:r>
           </a:p>
           <a:p>
             <a:r>
-              <a:rPr lang="en-US" dirty="0" smtClean="0"/>
+              <a:rPr lang="en-US" dirty="0"/>
               <a:t>Disneyland, opened July 1955</a:t>
             </a:r>
           </a:p>
           <a:p>
             <a:r>
-              <a:rPr lang="en-US" dirty="0" smtClean="0"/>
+              <a:rPr lang="en-US" dirty="0"/>
               <a:t>Silicon Valley: Western Electric, Raytheon, Remington Rand, Zenith, and Motorola</a:t>
             </a:r>
           </a:p>
           <a:p>
             <a:r>
-              <a:rPr lang="en-US" dirty="0" smtClean="0"/>
+              <a:rPr lang="en-US" dirty="0"/>
               <a:t>Toy maker Mattel (Hawthorne, CA): Barbie, Disney toys, etc.</a:t>
             </a:r>
           </a:p>
@@ -3221,13 +4003,6 @@
   <p:clrMapOvr>
     <a:masterClrMapping/>
   </p:clrMapOvr>
-  <p:timing>
-    <p:tnLst>
-      <p:par>
-        <p:cTn id="1" dur="indefinite" restart="never" nodeType="tmRoot"/>
-      </p:par>
-    </p:tnLst>
-  </p:timing>
 </p:sld>
 </file>
 
@@ -3264,14 +4039,11 @@
           <a:lstStyle/>
           <a:p>
             <a:r>
-              <a:rPr lang="en-US" b="1" dirty="0" smtClean="0">
+              <a:rPr lang="en-US" b="1" dirty="0">
                 <a:latin typeface="Copperplate Gothic Bold" panose="020E0705020206020404" pitchFamily="34" charset="0"/>
               </a:rPr>
               <a:t>Surf culture, 1950s-1960s</a:t>
             </a:r>
-            <a:endParaRPr lang="en-US" b="1" dirty="0">
-              <a:latin typeface="Copperplate Gothic Bold" panose="020E0705020206020404" pitchFamily="34" charset="0"/>
-            </a:endParaRPr>
           </a:p>
         </p:txBody>
       </p:sp>
@@ -3296,41 +4068,41 @@
           <a:lstStyle/>
           <a:p>
             <a:r>
-              <a:rPr lang="en-US" dirty="0" smtClean="0"/>
+              <a:rPr lang="en-US" dirty="0"/>
               <a:t>Boards, sticks, woodies, polys</a:t>
             </a:r>
           </a:p>
           <a:p>
             <a:r>
-              <a:rPr lang="en-US" dirty="0" smtClean="0"/>
-              <a:t>Soup, big guns, harry</a:t>
-            </a:r>
-          </a:p>
-          <a:p>
-            <a:r>
-              <a:rPr lang="en-US" dirty="0" smtClean="0"/>
+              <a:rPr lang="en-US" dirty="0"/>
+              <a:t>Soup, big guns, hairy</a:t>
+            </a:r>
+          </a:p>
+          <a:p>
+            <a:r>
+              <a:rPr lang="en-US" dirty="0"/>
               <a:t>Hot dogging, </a:t>
             </a:r>
           </a:p>
           <a:p>
             <a:r>
-              <a:rPr lang="en-US" dirty="0" smtClean="0"/>
+              <a:rPr lang="en-US" dirty="0"/>
               <a:t>Bunnies, </a:t>
             </a:r>
             <a:r>
-              <a:rPr lang="en-US" dirty="0" err="1" smtClean="0"/>
+              <a:rPr lang="en-US" dirty="0" err="1"/>
               <a:t>Barbies</a:t>
             </a:r>
-            <a:endParaRPr lang="en-US" dirty="0" smtClean="0"/>
-          </a:p>
-          <a:p>
-            <a:r>
-              <a:rPr lang="en-US" dirty="0" smtClean="0"/>
+            <a:endParaRPr lang="en-US" dirty="0"/>
+          </a:p>
+          <a:p>
+            <a:r>
+              <a:rPr lang="en-US" dirty="0"/>
               <a:t>Gremlins, kooks</a:t>
             </a:r>
           </a:p>
           <a:p>
-            <a:endParaRPr lang="en-US" dirty="0" smtClean="0"/>
+            <a:endParaRPr lang="en-US" dirty="0"/>
           </a:p>
           <a:p>
             <a:endParaRPr lang="en-US" dirty="0"/>
@@ -3377,13 +4149,6 @@
   <p:clrMapOvr>
     <a:masterClrMapping/>
   </p:clrMapOvr>
-  <p:timing>
-    <p:tnLst>
-      <p:par>
-        <p:cTn id="1" dur="indefinite" restart="never" nodeType="tmRoot"/>
-      </p:par>
-    </p:tnLst>
-  </p:timing>
 </p:sld>
 </file>
 
@@ -3414,20 +4179,34 @@
             <p:ph type="title"/>
           </p:nvPr>
         </p:nvSpPr>
-        <p:spPr/>
+        <p:spPr>
+          <a:xfrm>
+            <a:off x="838200" y="124423"/>
+            <a:ext cx="10515600" cy="1004581"/>
+          </a:xfrm>
+        </p:spPr>
         <p:txBody>
           <a:bodyPr/>
           <a:lstStyle/>
           <a:p>
             <a:r>
-              <a:rPr lang="en-US" b="1" dirty="0" smtClean="0">
+              <a:rPr lang="en-US" b="1" dirty="0">
                 <a:latin typeface="Copperplate Gothic Bold" panose="020E0705020206020404" pitchFamily="34" charset="0"/>
               </a:rPr>
-              <a:t>Surf music</a:t>
-            </a:r>
-            <a:endParaRPr lang="en-US" b="1" dirty="0">
-              <a:latin typeface="Copperplate Gothic Bold" panose="020E0705020206020404" pitchFamily="34" charset="0"/>
-            </a:endParaRPr>
+              <a:t>Surf music: </a:t>
+            </a:r>
+            <a:r>
+              <a:rPr lang="en-US" b="1" dirty="0" err="1">
+                <a:latin typeface="Copperplate Gothic Bold" panose="020E0705020206020404" pitchFamily="34" charset="0"/>
+              </a:rPr>
+              <a:t>Miserlou</a:t>
+            </a:r>
+            <a:r>
+              <a:rPr lang="en-US" b="1" dirty="0">
+                <a:latin typeface="Copperplate Gothic Bold" panose="020E0705020206020404" pitchFamily="34" charset="0"/>
+              </a:rPr>
+              <a:t>?</a:t>
+            </a:r>
           </a:p>
         </p:txBody>
       </p:sp>
@@ -3441,28 +4220,55 @@
             <p:ph idx="1"/>
           </p:nvPr>
         </p:nvSpPr>
-        <p:spPr/>
-        <p:txBody>
-          <a:bodyPr/>
-          <a:lstStyle/>
-          <a:p>
-            <a:r>
-              <a:rPr lang="en-US" dirty="0" smtClean="0"/>
-              <a:t>Richard </a:t>
-            </a:r>
-            <a:r>
-              <a:rPr lang="en-US" dirty="0" err="1" smtClean="0"/>
+        <p:spPr>
+          <a:xfrm>
+            <a:off x="315686" y="1464905"/>
+            <a:ext cx="8707016" cy="4839155"/>
+          </a:xfrm>
+        </p:spPr>
+        <p:txBody>
+          <a:bodyPr>
+            <a:normAutofit fontScale="85000" lnSpcReduction="20000"/>
+          </a:bodyPr>
+          <a:lstStyle/>
+          <a:p>
+            <a:r>
+              <a:rPr lang="en-US" dirty="0"/>
+              <a:t>Richard Anthony </a:t>
+            </a:r>
+            <a:r>
+              <a:rPr lang="en-US" dirty="0" err="1"/>
               <a:t>Monsour</a:t>
             </a:r>
             <a:r>
-              <a:rPr lang="en-US" dirty="0" smtClean="0"/>
-              <a:t>, from Boston to El Segundo, became Dick Dale</a:t>
-            </a:r>
-          </a:p>
-          <a:p>
-            <a:r>
-              <a:rPr lang="en-US" dirty="0" smtClean="0"/>
-              <a:t>Leo Fender: guitars and amps</a:t>
+              <a:rPr lang="en-US" dirty="0"/>
+              <a:t> (b. 1937) from Boston and Quincy, Mass.</a:t>
+            </a:r>
+          </a:p>
+          <a:p>
+            <a:r>
+              <a:rPr lang="en-US" dirty="0"/>
+              <a:t> After grade 11, moved to El Segundo, learned to play piano, ukulele, guitar, trumpet, </a:t>
+            </a:r>
+            <a:r>
+              <a:rPr lang="en-US" dirty="0" err="1"/>
+              <a:t>tarabaki</a:t>
+            </a:r>
+            <a:r>
+              <a:rPr lang="en-US" dirty="0"/>
+              <a:t>, and drums.</a:t>
+            </a:r>
+          </a:p>
+          <a:p>
+            <a:r>
+              <a:rPr lang="en-US" dirty="0"/>
+              <a:t>Learned to surf, and then made music to match.</a:t>
+            </a:r>
+          </a:p>
+          <a:p>
+            <a:r>
+              <a:rPr lang="en-US" dirty="0"/>
+              <a:t>Leo Fender: guitars and amps (first 100-watt amp)</a:t>
             </a:r>
           </a:p>
           <a:p>
@@ -3499,42 +4305,36 @@
           </a:p>
           <a:p>
             <a:r>
-              <a:rPr lang="en-US" dirty="0" smtClean="0"/>
-              <a:t>Dick </a:t>
-            </a:r>
-            <a:r>
-              <a:rPr lang="en-US" dirty="0" smtClean="0"/>
-              <a:t>Dale and the Del-Tones, “</a:t>
-            </a:r>
-            <a:r>
-              <a:rPr lang="en-US" dirty="0" err="1" smtClean="0"/>
+              <a:rPr lang="en-US" dirty="0"/>
+              <a:t>Dick Dale and the Del-Tones, “</a:t>
+            </a:r>
+            <a:r>
+              <a:rPr lang="en-US" dirty="0" err="1"/>
               <a:t>Miserlou</a:t>
             </a:r>
             <a:r>
-              <a:rPr lang="en-US" dirty="0" smtClean="0"/>
+              <a:rPr lang="en-US" dirty="0"/>
               <a:t>,” 1962: </a:t>
             </a:r>
           </a:p>
           <a:p>
             <a:pPr lvl="1"/>
             <a:r>
-              <a:rPr lang="en-US" dirty="0" smtClean="0">
+              <a:rPr lang="en-US" dirty="0">
                 <a:hlinkClick r:id="rId3"/>
               </a:rPr>
-              <a:t>https://www.youtube.com/watch?v=-</a:t>
-            </a:r>
-            <a:r>
-              <a:rPr lang="en-US" dirty="0" smtClean="0">
-                <a:hlinkClick r:id="rId3"/>
-              </a:rPr>
-              <a:t>y3h9p_c5-M</a:t>
+              <a:t>https://www.youtube.com/watch?v=-y3h9p_c5-M</a:t>
             </a:r>
             <a:endParaRPr lang="en-US" dirty="0"/>
           </a:p>
           <a:p>
             <a:r>
-              <a:rPr lang="en-US" dirty="0" smtClean="0"/>
-              <a:t>Beach Party (1963):</a:t>
+              <a:rPr lang="en-US" i="1" dirty="0"/>
+              <a:t>Beach Party</a:t>
+            </a:r>
+            <a:r>
+              <a:rPr lang="en-US" dirty="0"/>
+              <a:t> (1963 film):</a:t>
             </a:r>
           </a:p>
           <a:p>
@@ -3543,22 +4343,15 @@
               <a:rPr lang="en-US" dirty="0">
                 <a:hlinkClick r:id="rId4"/>
               </a:rPr>
-              <a:t>https://</a:t>
-            </a:r>
-            <a:r>
-              <a:rPr lang="en-US" dirty="0" smtClean="0">
-                <a:hlinkClick r:id="rId4"/>
-              </a:rPr>
-              <a:t>www.youtube.com/watch?v=tm_G_DCJMmY</a:t>
-            </a:r>
-            <a:endParaRPr lang="en-US" dirty="0" smtClean="0"/>
-          </a:p>
-          <a:p>
-            <a:pPr lvl="1"/>
-            <a:endParaRPr lang="en-US" dirty="0" smtClean="0"/>
-          </a:p>
-          <a:p>
+              <a:t>https://www.youtube.com/watch?v=tm_G_DCJMmY</a:t>
+            </a:r>
             <a:endParaRPr lang="en-US" dirty="0"/>
+          </a:p>
+          <a:p>
+            <a:r>
+              <a:rPr lang="en-US" dirty="0"/>
+              <a:t>Single-note staccato playing influenced, Hendrix, emergence of Heavy Metal</a:t>
+            </a:r>
           </a:p>
         </p:txBody>
       </p:sp>
@@ -3584,8 +4377,8 @@
         </p:blipFill>
         <p:spPr>
           <a:xfrm>
-            <a:off x="8686800" y="3403795"/>
-            <a:ext cx="2667000" cy="2667000"/>
+            <a:off x="9142445" y="2620022"/>
+            <a:ext cx="2733869" cy="2733869"/>
           </a:xfrm>
           <a:prstGeom prst="rect">
             <a:avLst/>
@@ -3602,13 +4395,6 @@
   <p:clrMapOvr>
     <a:masterClrMapping/>
   </p:clrMapOvr>
-  <p:timing>
-    <p:tnLst>
-      <p:par>
-        <p:cTn id="1" dur="indefinite" restart="never" nodeType="tmRoot"/>
-      </p:par>
-    </p:tnLst>
-  </p:timing>
 </p:sld>
 </file>
 
@@ -3631,7 +4417,13 @@
       </p:grpSpPr>
       <p:sp>
         <p:nvSpPr>
-          <p:cNvPr id="2" name="Title 1"/>
+          <p:cNvPr id="2" name="Title 1">
+            <a:extLst>
+              <a:ext uri="{FF2B5EF4-FFF2-40B4-BE49-F238E27FC236}">
+                <a16:creationId xmlns:a16="http://schemas.microsoft.com/office/drawing/2014/main" id="{260BBEFC-100C-4BE2-8727-3ECDEB876730}"/>
+              </a:ext>
+            </a:extLst>
+          </p:cNvPr>
           <p:cNvSpPr>
             <a:spLocks noGrp="1"/>
           </p:cNvSpPr>
@@ -3639,26 +4431,32 @@
             <p:ph type="title"/>
           </p:nvPr>
         </p:nvSpPr>
-        <p:spPr/>
+        <p:spPr>
+          <a:xfrm>
+            <a:off x="838200" y="365126"/>
+            <a:ext cx="10515600" cy="918926"/>
+          </a:xfrm>
+        </p:spPr>
         <p:txBody>
           <a:bodyPr/>
           <a:lstStyle/>
           <a:p>
             <a:r>
-              <a:rPr lang="en-US" b="1" dirty="0" smtClean="0">
-                <a:latin typeface="Copperplate Gothic Bold" panose="020E0705020206020404" pitchFamily="34" charset="0"/>
-              </a:rPr>
-              <a:t>The Beach Boys, 1961-present</a:t>
-            </a:r>
-            <a:endParaRPr lang="en-US" b="1" dirty="0">
-              <a:latin typeface="Copperplate Gothic Bold" panose="020E0705020206020404" pitchFamily="34" charset="0"/>
-            </a:endParaRPr>
-          </a:p>
-        </p:txBody>
-      </p:sp>
-      <p:sp>
-        <p:nvSpPr>
-          <p:cNvPr id="3" name="Content Placeholder 2"/>
+              <a:rPr lang="en-CA" b="1" dirty="0"/>
+              <a:t>Jan and Dean</a:t>
+            </a:r>
+          </a:p>
+        </p:txBody>
+      </p:sp>
+      <p:sp>
+        <p:nvSpPr>
+          <p:cNvPr id="3" name="Content Placeholder 2">
+            <a:extLst>
+              <a:ext uri="{FF2B5EF4-FFF2-40B4-BE49-F238E27FC236}">
+                <a16:creationId xmlns:a16="http://schemas.microsoft.com/office/drawing/2014/main" id="{52CA7832-28BD-4B21-A1D3-7AE06009D417}"/>
+              </a:ext>
+            </a:extLst>
+          </p:cNvPr>
           <p:cNvSpPr>
             <a:spLocks noGrp="1"/>
           </p:cNvSpPr>
@@ -3666,140 +4464,109 @@
             <p:ph idx="1"/>
           </p:nvPr>
         </p:nvSpPr>
-        <p:spPr/>
-        <p:txBody>
-          <a:bodyPr/>
-          <a:lstStyle/>
-          <a:p>
-            <a:r>
-              <a:rPr lang="en-US" dirty="0" smtClean="0"/>
-              <a:t>Hawthorne, CA</a:t>
-            </a:r>
-          </a:p>
-          <a:p>
-            <a:r>
-              <a:rPr lang="en-US" dirty="0" smtClean="0"/>
-              <a:t>Brothers</a:t>
-            </a:r>
-            <a:r>
-              <a:rPr lang="en-US" dirty="0"/>
-              <a:t> Brian, </a:t>
-            </a:r>
-            <a:r>
-              <a:rPr lang="en-US" dirty="0" smtClean="0"/>
-              <a:t>Dennis,</a:t>
-            </a:r>
-            <a:r>
-              <a:rPr lang="en-US" dirty="0"/>
-              <a:t> and Carl Wilson, their cousin Mike Love, and their friend Al </a:t>
-            </a:r>
-            <a:r>
-              <a:rPr lang="en-US" dirty="0" smtClean="0"/>
-              <a:t>Jardine</a:t>
-            </a:r>
-          </a:p>
-          <a:p>
-            <a:r>
-              <a:rPr lang="en-US" dirty="0" smtClean="0"/>
-              <a:t>First song, </a:t>
-            </a:r>
-            <a:r>
-              <a:rPr lang="en-US" dirty="0" smtClean="0"/>
-              <a:t>“</a:t>
-            </a:r>
-            <a:r>
-              <a:rPr lang="en-US" dirty="0" err="1" smtClean="0"/>
-              <a:t>Surfin</a:t>
-            </a:r>
-            <a:r>
-              <a:rPr lang="en-US" dirty="0" smtClean="0"/>
-              <a:t>’”, 1961</a:t>
-            </a:r>
-          </a:p>
-          <a:p>
-            <a:r>
-              <a:rPr lang="en-US" dirty="0" smtClean="0"/>
-              <a:t>Many others followed: most famous was “</a:t>
-            </a:r>
-            <a:r>
-              <a:rPr lang="en-US" dirty="0" err="1" smtClean="0"/>
-              <a:t>Surfin</a:t>
-            </a:r>
-            <a:r>
-              <a:rPr lang="en-US" dirty="0" smtClean="0"/>
-              <a:t> USA”: </a:t>
-            </a:r>
-          </a:p>
-          <a:p>
-            <a:r>
-              <a:rPr lang="en-US" dirty="0">
-                <a:hlinkClick r:id="rId2"/>
-              </a:rPr>
-              <a:t>https://</a:t>
-            </a:r>
-            <a:r>
-              <a:rPr lang="en-US" dirty="0" smtClean="0">
-                <a:hlinkClick r:id="rId2"/>
-              </a:rPr>
-              <a:t>www.youtube.com/watch?v=dbs1luUIxCE</a:t>
-            </a:r>
-            <a:endParaRPr lang="en-US" dirty="0" smtClean="0"/>
-          </a:p>
-          <a:p>
-            <a:r>
-              <a:rPr lang="en-US" dirty="0" smtClean="0"/>
-              <a:t>Good Vibrations, 1966:</a:t>
-            </a:r>
-          </a:p>
-          <a:p>
-            <a:r>
-              <a:rPr lang="en-US" dirty="0">
-                <a:hlinkClick r:id="rId3"/>
-              </a:rPr>
-              <a:t>https://</a:t>
-            </a:r>
-            <a:r>
-              <a:rPr lang="en-US" dirty="0" smtClean="0">
-                <a:hlinkClick r:id="rId3"/>
-              </a:rPr>
-              <a:t>www.youtube.com/watch?v=5IYJtdtr678</a:t>
-            </a:r>
-            <a:endParaRPr lang="en-US" dirty="0" smtClean="0"/>
-          </a:p>
-          <a:p>
-            <a:endParaRPr lang="en-US" dirty="0" smtClean="0"/>
-          </a:p>
-          <a:p>
-            <a:endParaRPr lang="en-US" dirty="0" smtClean="0"/>
-          </a:p>
-          <a:p>
-            <a:endParaRPr lang="en-US" dirty="0"/>
+        <p:spPr>
+          <a:xfrm>
+            <a:off x="838200" y="1533796"/>
+            <a:ext cx="11000362" cy="4545992"/>
+          </a:xfrm>
+        </p:spPr>
+        <p:txBody>
+          <a:bodyPr>
+            <a:normAutofit fontScale="92500" lnSpcReduction="10000"/>
+          </a:bodyPr>
+          <a:lstStyle/>
+          <a:p>
+            <a:r>
+              <a:rPr lang="en-CA" dirty="0"/>
+              <a:t>William Jan Berry (1941-2004): father was Howard Hughes’ project manager for the “Spruce Goose”. Grew up in Bel Air.</a:t>
+            </a:r>
+          </a:p>
+          <a:p>
+            <a:r>
+              <a:rPr lang="en-CA" dirty="0"/>
+              <a:t>Dean </a:t>
+            </a:r>
+            <a:r>
+              <a:rPr lang="en-CA" dirty="0" err="1"/>
+              <a:t>Ormsby</a:t>
+            </a:r>
+            <a:r>
+              <a:rPr lang="en-CA" dirty="0"/>
+              <a:t> </a:t>
+            </a:r>
+            <a:r>
+              <a:rPr lang="en-CA" dirty="0" err="1"/>
+              <a:t>Torrence</a:t>
+            </a:r>
+            <a:r>
+              <a:rPr lang="en-CA" dirty="0"/>
+              <a:t> (b. 1940): father sales manager for Wilshire Oil.</a:t>
+            </a:r>
+          </a:p>
+          <a:p>
+            <a:r>
+              <a:rPr lang="en-CA" dirty="0"/>
+              <a:t>Went to the same Junior and High School, played football and sang in the locker room.</a:t>
+            </a:r>
+          </a:p>
+          <a:p>
+            <a:r>
+              <a:rPr lang="en-CA" dirty="0"/>
+              <a:t>Had a hit in 1959 </a:t>
+            </a:r>
+            <a:r>
+              <a:rPr lang="en-CA"/>
+              <a:t>with “Baby </a:t>
+            </a:r>
+            <a:r>
+              <a:rPr lang="en-CA" dirty="0"/>
+              <a:t>Talk”, got to number 10.</a:t>
+            </a:r>
+          </a:p>
+          <a:p>
+            <a:r>
+              <a:rPr lang="en-CA" dirty="0"/>
+              <a:t>Brian Wilson gave them a hit in 1963 with “Surf City,” first surf song to top the Hot 100.</a:t>
+            </a:r>
+          </a:p>
+          <a:p>
+            <a:r>
+              <a:rPr lang="en-CA" dirty="0"/>
+              <a:t>They had 16 top 40 hits, and 26 songs making the top 100 from 1958-1966.</a:t>
+            </a:r>
+          </a:p>
+          <a:p>
+            <a:r>
+              <a:rPr lang="en-CA" dirty="0"/>
+              <a:t>12 April 1966: Jan crashed is Corvette into a parked truck (brain damage, partially paralyzed).</a:t>
+            </a:r>
           </a:p>
         </p:txBody>
       </p:sp>
     </p:spTree>
     <p:extLst>
       <p:ext uri="{BB962C8B-B14F-4D97-AF65-F5344CB8AC3E}">
-        <p14:creationId xmlns:p14="http://schemas.microsoft.com/office/powerpoint/2010/main" val="183435330"/>
+        <p14:creationId xmlns:p14="http://schemas.microsoft.com/office/powerpoint/2010/main" val="1775085047"/>
       </p:ext>
     </p:extLst>
   </p:cSld>
   <p:clrMapOvr>
     <a:masterClrMapping/>
   </p:clrMapOvr>
-  <p:timing>
-    <p:tnLst>
-      <p:par>
-        <p:cTn id="1" dur="indefinite" restart="never" nodeType="tmRoot"/>
-      </p:par>
-    </p:tnLst>
-  </p:timing>
 </p:sld>
 </file>
 
 <file path=ppt/slides/slide7.xml><?xml version="1.0" encoding="utf-8"?>
 <p:sld xmlns:a="http://schemas.openxmlformats.org/drawingml/2006/main" xmlns:r="http://schemas.openxmlformats.org/officeDocument/2006/relationships" xmlns:p="http://schemas.openxmlformats.org/presentationml/2006/main">
   <p:cSld>
+    <p:bg>
+      <p:bgPr>
+        <a:solidFill>
+          <a:schemeClr val="bg1"/>
+        </a:solidFill>
+        <a:effectLst/>
+      </p:bgPr>
+    </p:bg>
     <p:spTree>
       <p:nvGrpSpPr>
         <p:cNvPr id="1" name=""/>
@@ -3814,35 +4581,15 @@
           <a:chExt cx="0" cy="0"/>
         </a:xfrm>
       </p:grpSpPr>
-      <p:sp>
-        <p:nvSpPr>
-          <p:cNvPr id="2" name="Title 1"/>
-          <p:cNvSpPr>
-            <a:spLocks noGrp="1"/>
-          </p:cNvSpPr>
-          <p:nvPr>
-            <p:ph type="title"/>
-          </p:nvPr>
-        </p:nvSpPr>
-        <p:spPr/>
-        <p:txBody>
-          <a:bodyPr>
-            <a:normAutofit/>
-          </a:bodyPr>
-          <a:lstStyle/>
-          <a:p>
-            <a:pPr algn="ctr"/>
-            <a:r>
-              <a:rPr lang="en-US" sz="7200" b="1" dirty="0" smtClean="0"/>
-              <a:t>The Beach Boys, 1965</a:t>
-            </a:r>
-            <a:endParaRPr lang="en-US" sz="7200" b="1" dirty="0"/>
-          </a:p>
-        </p:txBody>
-      </p:sp>
       <p:pic>
         <p:nvPicPr>
-          <p:cNvPr id="4" name="Content Placeholder 3"/>
+          <p:cNvPr id="5" name="Content Placeholder 4" descr="A group of people posing for a photo&#10;&#10;Description generated with very high confidence">
+            <a:extLst>
+              <a:ext uri="{FF2B5EF4-FFF2-40B4-BE49-F238E27FC236}">
+                <a16:creationId xmlns:a16="http://schemas.microsoft.com/office/drawing/2014/main" id="{5F1DE13C-5E33-47BB-BFC6-F34D96C349F2}"/>
+              </a:ext>
+            </a:extLst>
+          </p:cNvPr>
           <p:cNvPicPr>
             <a:picLocks noGrp="1" noChangeAspect="1"/>
           </p:cNvPicPr>
@@ -3850,7 +4597,7 @@
             <p:ph idx="1"/>
           </p:nvPr>
         </p:nvPicPr>
-        <p:blipFill>
+        <p:blipFill rotWithShape="1">
           <a:blip r:embed="rId2">
             <a:extLst>
               <a:ext uri="{28A0092B-C50C-407E-A947-70E740481C1C}">
@@ -3858,34 +4605,64 @@
               </a:ext>
             </a:extLst>
           </a:blip>
-          <a:stretch>
-            <a:fillRect/>
-          </a:stretch>
+          <a:srcRect b="29688"/>
+          <a:stretch/>
         </p:blipFill>
         <p:spPr>
           <a:xfrm>
-            <a:off x="2876282" y="1503653"/>
-            <a:ext cx="6439436" cy="5031820"/>
+            <a:off x="20" y="10"/>
+            <a:ext cx="7534636" cy="6857990"/>
+          </a:xfrm>
+          <a:prstGeom prst="rect">
+            <a:avLst/>
+          </a:prstGeom>
+        </p:spPr>
+      </p:pic>
+      <p:sp>
+        <p:nvSpPr>
+          <p:cNvPr id="2" name="Title 1">
+            <a:extLst>
+              <a:ext uri="{FF2B5EF4-FFF2-40B4-BE49-F238E27FC236}">
+                <a16:creationId xmlns:a16="http://schemas.microsoft.com/office/drawing/2014/main" id="{0A1D1FF1-AEF2-4E91-8609-291AAA488493}"/>
+              </a:ext>
+            </a:extLst>
+          </p:cNvPr>
+          <p:cNvSpPr>
+            <a:spLocks noGrp="1"/>
+          </p:cNvSpPr>
+          <p:nvPr>
+            <p:ph type="title"/>
+          </p:nvPr>
+        </p:nvSpPr>
+        <p:spPr>
+          <a:xfrm>
+            <a:off x="8153399" y="365125"/>
+            <a:ext cx="3430605" cy="5530319"/>
           </a:xfrm>
         </p:spPr>
-      </p:pic>
+        <p:txBody>
+          <a:bodyPr vert="horz" lIns="91440" tIns="45720" rIns="91440" bIns="45720" rtlCol="0" anchor="ctr">
+            <a:normAutofit/>
+          </a:bodyPr>
+          <a:lstStyle/>
+          <a:p>
+            <a:r>
+              <a:rPr lang="en-US" dirty="0"/>
+              <a:t>Jan and Dean, 1964</a:t>
+            </a:r>
+          </a:p>
+        </p:txBody>
+      </p:sp>
     </p:spTree>
     <p:extLst>
       <p:ext uri="{BB962C8B-B14F-4D97-AF65-F5344CB8AC3E}">
-        <p14:creationId xmlns:p14="http://schemas.microsoft.com/office/powerpoint/2010/main" val="25515357"/>
+        <p14:creationId xmlns:p14="http://schemas.microsoft.com/office/powerpoint/2010/main" val="1254510853"/>
       </p:ext>
     </p:extLst>
   </p:cSld>
   <p:clrMapOvr>
     <a:masterClrMapping/>
   </p:clrMapOvr>
-  <p:timing>
-    <p:tnLst>
-      <p:par>
-        <p:cTn id="1" dur="indefinite" restart="never" nodeType="tmRoot"/>
-      </p:par>
-    </p:tnLst>
-  </p:timing>
 </p:sld>
 </file>
 
@@ -3916,24 +4693,225 @@
             <p:ph type="title"/>
           </p:nvPr>
         </p:nvSpPr>
-        <p:spPr/>
+        <p:spPr>
+          <a:xfrm>
+            <a:off x="838200" y="365126"/>
+            <a:ext cx="10515600" cy="646928"/>
+          </a:xfrm>
+        </p:spPr>
         <p:txBody>
           <a:bodyPr>
-            <a:normAutofit/>
+            <a:normAutofit fontScale="90000"/>
           </a:bodyPr>
           <a:lstStyle/>
           <a:p>
             <a:r>
-              <a:rPr lang="en-US" sz="7200" b="1" dirty="0" smtClean="0"/>
-              <a:t>“Pet Sounds”, 1966</a:t>
-            </a:r>
-            <a:endParaRPr lang="en-US" sz="7200" b="1" dirty="0"/>
-          </a:p>
-        </p:txBody>
-      </p:sp>
+              <a:rPr lang="en-US" b="1" dirty="0">
+                <a:latin typeface="Copperplate Gothic Bold" panose="020E0705020206020404" pitchFamily="34" charset="0"/>
+              </a:rPr>
+              <a:t>The Beach Boys, 1961-present</a:t>
+            </a:r>
+          </a:p>
+        </p:txBody>
+      </p:sp>
+      <p:sp>
+        <p:nvSpPr>
+          <p:cNvPr id="3" name="Content Placeholder 2"/>
+          <p:cNvSpPr>
+            <a:spLocks noGrp="1"/>
+          </p:cNvSpPr>
+          <p:nvPr>
+            <p:ph idx="1"/>
+          </p:nvPr>
+        </p:nvSpPr>
+        <p:spPr>
+          <a:xfrm>
+            <a:off x="838200" y="1438184"/>
+            <a:ext cx="10791548" cy="4918228"/>
+          </a:xfrm>
+        </p:spPr>
+        <p:txBody>
+          <a:bodyPr>
+            <a:normAutofit fontScale="92500" lnSpcReduction="10000"/>
+          </a:bodyPr>
+          <a:lstStyle/>
+          <a:p>
+            <a:r>
+              <a:rPr lang="en-US" dirty="0"/>
+              <a:t>Hawthorne, CA</a:t>
+            </a:r>
+          </a:p>
+          <a:p>
+            <a:r>
+              <a:rPr lang="en-US" dirty="0"/>
+              <a:t>Brothers Brian, Dennis (the only surfer), and Carl Wilson, their cousin Mike Love, and their friend Al Jardine started a garage band, managed by father Murry Wilson.</a:t>
+            </a:r>
+          </a:p>
+          <a:p>
+            <a:r>
+              <a:rPr lang="en-US" dirty="0"/>
+              <a:t>Brian got a reel-to-reel tape recorder for his 16</a:t>
+            </a:r>
+            <a:r>
+              <a:rPr lang="en-US" baseline="30000" dirty="0"/>
+              <a:t>th</a:t>
+            </a:r>
+            <a:r>
+              <a:rPr lang="en-US" dirty="0"/>
+              <a:t> birthday.</a:t>
+            </a:r>
+          </a:p>
+          <a:p>
+            <a:r>
+              <a:rPr lang="en-US" dirty="0"/>
+              <a:t>First band: “</a:t>
+            </a:r>
+            <a:r>
+              <a:rPr lang="en-US" dirty="0" err="1"/>
+              <a:t>Pendletones</a:t>
+            </a:r>
+            <a:r>
+              <a:rPr lang="en-US" dirty="0"/>
+              <a:t>,” but first recording became The Beach Boys (Russ Regan of Era Records, later president of 20</a:t>
+            </a:r>
+            <a:r>
+              <a:rPr lang="en-US" baseline="30000" dirty="0"/>
+              <a:t>th</a:t>
+            </a:r>
+            <a:r>
+              <a:rPr lang="en-US" dirty="0"/>
+              <a:t>-Century Fox).</a:t>
+            </a:r>
+          </a:p>
+          <a:p>
+            <a:r>
+              <a:rPr lang="en-US" dirty="0"/>
+              <a:t>First song, “</a:t>
+            </a:r>
+            <a:r>
+              <a:rPr lang="en-US" dirty="0" err="1"/>
+              <a:t>Surfin</a:t>
+            </a:r>
+            <a:r>
+              <a:rPr lang="en-US" dirty="0"/>
+              <a:t>’”, 1961</a:t>
+            </a:r>
+          </a:p>
+          <a:p>
+            <a:r>
+              <a:rPr lang="en-US" dirty="0"/>
+              <a:t>Jazz, R&amp;B, Doo-wop influences</a:t>
+            </a:r>
+          </a:p>
+          <a:p>
+            <a:r>
+              <a:rPr lang="en-US" dirty="0"/>
+              <a:t>Many others followed: most famous was “</a:t>
+            </a:r>
+            <a:r>
+              <a:rPr lang="en-US" dirty="0" err="1"/>
+              <a:t>Surfin</a:t>
+            </a:r>
+            <a:r>
+              <a:rPr lang="en-US" dirty="0"/>
+              <a:t> USA”: [</a:t>
+            </a:r>
+            <a:r>
+              <a:rPr lang="en-US" dirty="0">
+                <a:hlinkClick r:id="rId2"/>
+              </a:rPr>
+              <a:t>link</a:t>
+            </a:r>
+            <a:r>
+              <a:rPr lang="en-US" dirty="0"/>
+              <a:t>]</a:t>
+            </a:r>
+          </a:p>
+          <a:p>
+            <a:pPr lvl="1"/>
+            <a:r>
+              <a:rPr lang="en-US" dirty="0"/>
+              <a:t>Music of Chuck Berry’s “Sweet Little Sixteen” (Jan. 1958): [</a:t>
+            </a:r>
+            <a:r>
+              <a:rPr lang="en-US" dirty="0">
+                <a:hlinkClick r:id="rId3"/>
+              </a:rPr>
+              <a:t>link</a:t>
+            </a:r>
+            <a:r>
+              <a:rPr lang="en-US" dirty="0"/>
+              <a:t>]</a:t>
+            </a:r>
+          </a:p>
+          <a:p>
+            <a:r>
+              <a:rPr lang="en-US" dirty="0"/>
+              <a:t>Good Vibrations, 1966: [</a:t>
+            </a:r>
+            <a:r>
+              <a:rPr lang="en-US" dirty="0">
+                <a:hlinkClick r:id="rId4"/>
+              </a:rPr>
+              <a:t>link</a:t>
+            </a:r>
+            <a:r>
+              <a:rPr lang="en-US" dirty="0"/>
+              <a:t>]</a:t>
+            </a:r>
+          </a:p>
+          <a:p>
+            <a:endParaRPr lang="en-US" dirty="0"/>
+          </a:p>
+        </p:txBody>
+      </p:sp>
+    </p:spTree>
+    <p:extLst>
+      <p:ext uri="{BB962C8B-B14F-4D97-AF65-F5344CB8AC3E}">
+        <p14:creationId xmlns:p14="http://schemas.microsoft.com/office/powerpoint/2010/main" val="183435330"/>
+      </p:ext>
+    </p:extLst>
+  </p:cSld>
+  <p:clrMapOvr>
+    <a:masterClrMapping/>
+  </p:clrMapOvr>
+</p:sld>
+</file>
+
+<file path=ppt/slides/slide9.xml><?xml version="1.0" encoding="utf-8"?>
+<p:sld xmlns:a="http://schemas.openxmlformats.org/drawingml/2006/main" xmlns:r="http://schemas.openxmlformats.org/officeDocument/2006/relationships" xmlns:p="http://schemas.openxmlformats.org/presentationml/2006/main">
+  <p:cSld>
+    <p:bg>
+      <p:bgPr>
+        <a:solidFill>
+          <a:schemeClr val="bg1"/>
+        </a:solidFill>
+        <a:effectLst/>
+      </p:bgPr>
+    </p:bg>
+    <p:spTree>
+      <p:nvGrpSpPr>
+        <p:cNvPr id="1" name=""/>
+        <p:cNvGrpSpPr/>
+        <p:nvPr/>
+      </p:nvGrpSpPr>
+      <p:grpSpPr>
+        <a:xfrm>
+          <a:off x="0" y="0"/>
+          <a:ext cx="0" cy="0"/>
+          <a:chOff x="0" y="0"/>
+          <a:chExt cx="0" cy="0"/>
+        </a:xfrm>
+      </p:grpSpPr>
       <p:pic>
         <p:nvPicPr>
-          <p:cNvPr id="4" name="Content Placeholder 3"/>
+          <p:cNvPr id="5" name="Content Placeholder 4" descr="A vintage photo of a group of people posing for a picture&#10;&#10;Description generated with very high confidence">
+            <a:extLst>
+              <a:ext uri="{FF2B5EF4-FFF2-40B4-BE49-F238E27FC236}">
+                <a16:creationId xmlns:a16="http://schemas.microsoft.com/office/drawing/2014/main" id="{B155197F-F1B0-46C4-87D1-EB3D8FA50550}"/>
+              </a:ext>
+            </a:extLst>
+          </p:cNvPr>
           <p:cNvPicPr>
             <a:picLocks noGrp="1" noChangeAspect="1"/>
           </p:cNvPicPr>
@@ -3942,7 +4920,7 @@
           </p:nvPr>
         </p:nvPicPr>
         <p:blipFill>
-          <a:blip r:embed="rId2" cstate="print">
+          <a:blip r:embed="rId3">
             <a:extLst>
               <a:ext uri="{28A0092B-C50C-407E-A947-70E740481C1C}">
                 <a14:useLocalDpi xmlns:a14="http://schemas.microsoft.com/office/drawing/2010/main" val="0"/>
@@ -3955,135 +4933,230 @@
         </p:blipFill>
         <p:spPr>
           <a:xfrm>
-            <a:off x="7659255" y="1931832"/>
-            <a:ext cx="4017334" cy="4017334"/>
-          </a:xfrm>
-        </p:spPr>
-      </p:pic>
-      <p:sp>
-        <p:nvSpPr>
-          <p:cNvPr id="5" name="TextBox 4"/>
-          <p:cNvSpPr txBox="1"/>
-          <p:nvPr/>
-        </p:nvSpPr>
-        <p:spPr>
-          <a:xfrm>
-            <a:off x="373486" y="1690688"/>
-            <a:ext cx="6091707" cy="5016758"/>
+            <a:off x="5251786" y="492573"/>
+            <a:ext cx="6357617" cy="5880796"/>
           </a:xfrm>
           <a:prstGeom prst="rect">
             <a:avLst/>
           </a:prstGeom>
-          <a:noFill/>
         </p:spPr>
-        <p:txBody>
-          <a:bodyPr wrap="square" rtlCol="0">
-            <a:spAutoFit/>
+      </p:pic>
+      <p:sp>
+        <p:nvSpPr>
+          <p:cNvPr id="16" name="Rectangle 9">
+            <a:extLst>
+              <a:ext uri="{FF2B5EF4-FFF2-40B4-BE49-F238E27FC236}">
+                <a16:creationId xmlns:a16="http://schemas.microsoft.com/office/drawing/2014/main" id="{AB45A142-4255-493C-8284-5D566C121B10}"/>
+              </a:ext>
+            </a:extLst>
+          </p:cNvPr>
+          <p:cNvSpPr>
+            <a:spLocks noGrp="1" noRot="1" noChangeAspect="1" noMove="1" noResize="1" noEditPoints="1" noAdjustHandles="1" noChangeArrowheads="1" noChangeShapeType="1" noTextEdit="1"/>
+          </p:cNvSpPr>
+          <p:nvPr>
+            <p:extLst>
+              <p:ext uri="{386F3935-93C4-4BCD-93E2-E3B085C9AB24}">
+                <p16:designElem xmlns:p16="http://schemas.microsoft.com/office/powerpoint/2015/main" val="1"/>
+              </p:ext>
+            </p:extLst>
+          </p:nvPr>
+        </p:nvSpPr>
+        <p:spPr bwMode="ltGray">
+          <a:xfrm>
+            <a:off x="336884" y="321177"/>
+            <a:ext cx="4332307" cy="6179552"/>
+          </a:xfrm>
+          <a:prstGeom prst="rect">
+            <a:avLst/>
+          </a:prstGeom>
+          <a:solidFill>
+            <a:schemeClr val="tx1">
+              <a:lumMod val="75000"/>
+              <a:lumOff val="25000"/>
+            </a:schemeClr>
+          </a:solidFill>
+          <a:ln w="127000" cap="sq" cmpd="thinThick">
+            <a:solidFill>
+              <a:schemeClr val="tx1">
+                <a:lumMod val="75000"/>
+                <a:lumOff val="25000"/>
+              </a:schemeClr>
+            </a:solidFill>
+          </a:ln>
+        </p:spPr>
+        <p:style>
+          <a:lnRef idx="2">
+            <a:schemeClr val="accent1">
+              <a:shade val="50000"/>
+            </a:schemeClr>
+          </a:lnRef>
+          <a:fillRef idx="1">
+            <a:schemeClr val="accent1"/>
+          </a:fillRef>
+          <a:effectRef idx="0">
+            <a:schemeClr val="accent1"/>
+          </a:effectRef>
+          <a:fontRef idx="minor">
+            <a:schemeClr val="lt1"/>
+          </a:fontRef>
+        </p:style>
+        <p:txBody>
+          <a:bodyPr rtlCol="0" anchor="ctr"/>
+          <a:lstStyle/>
+          <a:p>
+            <a:pPr algn="ctr"/>
+            <a:endParaRPr lang="en-US"/>
+          </a:p>
+        </p:txBody>
+      </p:sp>
+      <p:cxnSp>
+        <p:nvCxnSpPr>
+          <p:cNvPr id="17" name="Straight Connector 11">
+            <a:extLst>
+              <a:ext uri="{FF2B5EF4-FFF2-40B4-BE49-F238E27FC236}">
+                <a16:creationId xmlns:a16="http://schemas.microsoft.com/office/drawing/2014/main" id="{38FB9660-F42F-4313-BBC4-47C007FE484C}"/>
+              </a:ext>
+            </a:extLst>
+          </p:cNvPr>
+          <p:cNvCxnSpPr>
+            <a:cxnSpLocks noGrp="1" noRot="1" noChangeAspect="1" noMove="1" noResize="1" noEditPoints="1" noAdjustHandles="1" noChangeArrowheads="1" noChangeShapeType="1"/>
+          </p:cNvCxnSpPr>
+          <p:nvPr>
+            <p:extLst>
+              <p:ext uri="{386F3935-93C4-4BCD-93E2-E3B085C9AB24}">
+                <p16:designElem xmlns:p16="http://schemas.microsoft.com/office/powerpoint/2015/main" val="1"/>
+              </p:ext>
+            </p:extLst>
+          </p:nvPr>
+        </p:nvCxnSpPr>
+        <p:spPr>
+          <a:xfrm>
+            <a:off x="1191126" y="3910267"/>
+            <a:ext cx="2586790" cy="0"/>
+          </a:xfrm>
+          <a:prstGeom prst="line">
+            <a:avLst/>
+          </a:prstGeom>
+          <a:ln w="22225">
+            <a:solidFill>
+              <a:schemeClr val="bg1">
+                <a:lumMod val="85000"/>
+              </a:schemeClr>
+            </a:solidFill>
+          </a:ln>
+        </p:spPr>
+        <p:style>
+          <a:lnRef idx="1">
+            <a:schemeClr val="accent1"/>
+          </a:lnRef>
+          <a:fillRef idx="0">
+            <a:schemeClr val="accent1"/>
+          </a:fillRef>
+          <a:effectRef idx="0">
+            <a:schemeClr val="accent1"/>
+          </a:effectRef>
+          <a:fontRef idx="minor">
+            <a:schemeClr val="tx1"/>
+          </a:fontRef>
+        </p:style>
+      </p:cxnSp>
+      <p:sp>
+        <p:nvSpPr>
+          <p:cNvPr id="2" name="Title 1">
+            <a:extLst>
+              <a:ext uri="{FF2B5EF4-FFF2-40B4-BE49-F238E27FC236}">
+                <a16:creationId xmlns:a16="http://schemas.microsoft.com/office/drawing/2014/main" id="{BC9D9F16-3E10-4005-A146-725755DA1AC2}"/>
+              </a:ext>
+            </a:extLst>
+          </p:cNvPr>
+          <p:cNvSpPr>
+            <a:spLocks noGrp="1"/>
+          </p:cNvSpPr>
+          <p:nvPr>
+            <p:ph type="title"/>
+          </p:nvPr>
+        </p:nvSpPr>
+        <p:spPr>
+          <a:xfrm>
+            <a:off x="674237" y="914400"/>
+            <a:ext cx="3657600" cy="2887579"/>
+          </a:xfrm>
+        </p:spPr>
+        <p:txBody>
+          <a:bodyPr vert="horz" lIns="91440" tIns="45720" rIns="91440" bIns="45720" rtlCol="0" anchor="b">
+            <a:normAutofit/>
           </a:bodyPr>
           <a:lstStyle/>
           <a:p>
-            <a:pPr marL="285750" indent="-285750">
-              <a:buFont typeface="Arial" panose="020B0604020202020204" pitchFamily="34" charset="0"/>
-              <a:buChar char="•"/>
-            </a:pPr>
-            <a:r>
-              <a:rPr lang="en-US" sz="3200" dirty="0" smtClean="0"/>
-              <a:t>Brian Wilson’s project</a:t>
-            </a:r>
-          </a:p>
-          <a:p>
-            <a:pPr marL="285750" indent="-285750">
-              <a:buFont typeface="Arial" panose="020B0604020202020204" pitchFamily="34" charset="0"/>
-              <a:buChar char="•"/>
-            </a:pPr>
-            <a:r>
-              <a:rPr lang="en-US" sz="3200" dirty="0" smtClean="0"/>
-              <a:t>Worked with lyricist Tony Asher.</a:t>
-            </a:r>
-          </a:p>
-          <a:p>
-            <a:pPr marL="285750" indent="-285750">
-              <a:buFont typeface="Arial" panose="020B0604020202020204" pitchFamily="34" charset="0"/>
-              <a:buChar char="•"/>
-            </a:pPr>
-            <a:r>
-              <a:rPr lang="en-US" sz="3200" dirty="0" smtClean="0"/>
-              <a:t>Stopped touring.</a:t>
-            </a:r>
-          </a:p>
-          <a:p>
-            <a:pPr marL="285750" indent="-285750">
-              <a:buFont typeface="Arial" panose="020B0604020202020204" pitchFamily="34" charset="0"/>
-              <a:buChar char="•"/>
-            </a:pPr>
-            <a:r>
-              <a:rPr lang="en-US" sz="3200" dirty="0" smtClean="0"/>
-              <a:t>Focused on recording.</a:t>
-            </a:r>
-          </a:p>
-          <a:p>
-            <a:pPr marL="285750" indent="-285750">
-              <a:buFont typeface="Arial" panose="020B0604020202020204" pitchFamily="34" charset="0"/>
-              <a:buChar char="•"/>
-            </a:pPr>
-            <a:r>
-              <a:rPr lang="en-US" sz="3200" dirty="0" smtClean="0"/>
-              <a:t>First rock concept album</a:t>
-            </a:r>
-          </a:p>
-          <a:p>
-            <a:pPr marL="285750" indent="-285750">
-              <a:buFont typeface="Arial" panose="020B0604020202020204" pitchFamily="34" charset="0"/>
-              <a:buChar char="•"/>
-            </a:pPr>
-            <a:r>
-              <a:rPr lang="en-US" sz="3200" dirty="0" smtClean="0"/>
-              <a:t>Initially, not well received in USA, though embraced in the UK.</a:t>
-            </a:r>
-          </a:p>
-          <a:p>
-            <a:pPr marL="285750" indent="-285750">
-              <a:buFont typeface="Arial" panose="020B0604020202020204" pitchFamily="34" charset="0"/>
-              <a:buChar char="•"/>
-            </a:pPr>
-            <a:r>
-              <a:rPr lang="en-US" sz="3200" dirty="0" smtClean="0"/>
-              <a:t>Single “Wouldn’t it be nice”</a:t>
-            </a:r>
-          </a:p>
-          <a:p>
-            <a:pPr marL="285750" indent="-285750">
-              <a:buFont typeface="Arial" panose="020B0604020202020204" pitchFamily="34" charset="0"/>
-              <a:buChar char="•"/>
-            </a:pPr>
-            <a:endParaRPr lang="en-US" sz="3200" dirty="0" smtClean="0"/>
-          </a:p>
-          <a:p>
-            <a:pPr marL="285750" indent="-285750">
-              <a:buFont typeface="Arial" panose="020B0604020202020204" pitchFamily="34" charset="0"/>
-              <a:buChar char="•"/>
-            </a:pPr>
-            <a:endParaRPr lang="en-US" sz="3200" dirty="0"/>
+            <a:pPr algn="ctr"/>
+            <a:r>
+              <a:rPr lang="en-US" sz="4100" kern="1200" dirty="0">
+                <a:solidFill>
+                  <a:schemeClr val="bg1"/>
+                </a:solidFill>
+                <a:latin typeface="+mj-lt"/>
+                <a:ea typeface="+mj-ea"/>
+                <a:cs typeface="+mj-cs"/>
+              </a:rPr>
+              <a:t>The Beach Boys (</a:t>
+            </a:r>
+            <a:r>
+              <a:rPr lang="en-US" sz="4100" kern="1200" dirty="0" err="1">
+                <a:solidFill>
+                  <a:schemeClr val="bg1"/>
+                </a:solidFill>
+                <a:latin typeface="+mj-lt"/>
+                <a:ea typeface="+mj-ea"/>
+                <a:cs typeface="+mj-cs"/>
+              </a:rPr>
+              <a:t>Pendletones</a:t>
+            </a:r>
+            <a:r>
+              <a:rPr lang="en-US" sz="4100" kern="1200" dirty="0">
+                <a:solidFill>
+                  <a:schemeClr val="bg1"/>
+                </a:solidFill>
+                <a:latin typeface="+mj-lt"/>
+                <a:ea typeface="+mj-ea"/>
+                <a:cs typeface="+mj-cs"/>
+              </a:rPr>
+              <a:t>) in </a:t>
+            </a:r>
+            <a:r>
+              <a:rPr lang="en-US" sz="4100" kern="1200" dirty="0" err="1">
+                <a:solidFill>
+                  <a:schemeClr val="bg1"/>
+                </a:solidFill>
+                <a:latin typeface="+mj-lt"/>
+                <a:ea typeface="+mj-ea"/>
+                <a:cs typeface="+mj-cs"/>
+              </a:rPr>
+              <a:t>Pendletons</a:t>
+            </a:r>
+            <a:r>
+              <a:rPr lang="en-US" sz="4100" kern="1200" dirty="0">
+                <a:solidFill>
+                  <a:schemeClr val="bg1"/>
+                </a:solidFill>
+                <a:latin typeface="+mj-lt"/>
+                <a:ea typeface="+mj-ea"/>
+                <a:cs typeface="+mj-cs"/>
+              </a:rPr>
+              <a:t>, 1963</a:t>
+            </a:r>
           </a:p>
         </p:txBody>
       </p:sp>
     </p:spTree>
     <p:extLst>
       <p:ext uri="{BB962C8B-B14F-4D97-AF65-F5344CB8AC3E}">
-        <p14:creationId xmlns:p14="http://schemas.microsoft.com/office/powerpoint/2010/main" val="426149005"/>
+        <p14:creationId xmlns:p14="http://schemas.microsoft.com/office/powerpoint/2010/main" val="1480136591"/>
       </p:ext>
     </p:extLst>
   </p:cSld>
   <p:clrMapOvr>
     <a:masterClrMapping/>
   </p:clrMapOvr>
-  <p:timing>
-    <p:tnLst>
-      <p:par>
-        <p:cTn id="1" dur="indefinite" restart="never" nodeType="tmRoot"/>
-      </p:par>
-    </p:tnLst>
-  </p:timing>
 </p:sld>
 </file>
 
@@ -4346,4 +5419,299 @@
     </a:ext>
   </a:extLst>
 </a:theme>
+</file>
+
+<file path=ppt/theme/theme2.xml><?xml version="1.0" encoding="utf-8"?>
+<a:theme xmlns:a="http://schemas.openxmlformats.org/drawingml/2006/main" name="Office Theme">
+  <a:themeElements>
+    <a:clrScheme name="Office">
+      <a:dk1>
+        <a:sysClr val="windowText" lastClr="000000"/>
+      </a:dk1>
+      <a:lt1>
+        <a:sysClr val="window" lastClr="FFFFFF"/>
+      </a:lt1>
+      <a:dk2>
+        <a:srgbClr val="44546A"/>
+      </a:dk2>
+      <a:lt2>
+        <a:srgbClr val="E7E6E6"/>
+      </a:lt2>
+      <a:accent1>
+        <a:srgbClr val="4472C4"/>
+      </a:accent1>
+      <a:accent2>
+        <a:srgbClr val="ED7D31"/>
+      </a:accent2>
+      <a:accent3>
+        <a:srgbClr val="A5A5A5"/>
+      </a:accent3>
+      <a:accent4>
+        <a:srgbClr val="FFC000"/>
+      </a:accent4>
+      <a:accent5>
+        <a:srgbClr val="5B9BD5"/>
+      </a:accent5>
+      <a:accent6>
+        <a:srgbClr val="70AD47"/>
+      </a:accent6>
+      <a:hlink>
+        <a:srgbClr val="0563C1"/>
+      </a:hlink>
+      <a:folHlink>
+        <a:srgbClr val="954F72"/>
+      </a:folHlink>
+    </a:clrScheme>
+    <a:fontScheme name="Office">
+      <a:majorFont>
+        <a:latin typeface="Calibri Light" panose="020F0302020204030204"/>
+        <a:ea typeface=""/>
+        <a:cs typeface=""/>
+        <a:font script="Jpan" typeface="游ゴシック Light"/>
+        <a:font script="Hang" typeface="맑은 고딕"/>
+        <a:font script="Hans" typeface="等线 Light"/>
+        <a:font script="Hant" typeface="新細明體"/>
+        <a:font script="Arab" typeface="Times New Roman"/>
+        <a:font script="Hebr" typeface="Times New Roman"/>
+        <a:font script="Thai" typeface="Angsana New"/>
+        <a:font script="Ethi" typeface="Nyala"/>
+        <a:font script="Beng" typeface="Vrinda"/>
+        <a:font script="Gujr" typeface="Shruti"/>
+        <a:font script="Khmr" typeface="MoolBoran"/>
+        <a:font script="Knda" typeface="Tunga"/>
+        <a:font script="Guru" typeface="Raavi"/>
+        <a:font script="Cans" typeface="Euphemia"/>
+        <a:font script="Cher" typeface="Plantagenet Cherokee"/>
+        <a:font script="Yiii" typeface="Microsoft Yi Baiti"/>
+        <a:font script="Tibt" typeface="Microsoft Himalaya"/>
+        <a:font script="Thaa" typeface="MV Boli"/>
+        <a:font script="Deva" typeface="Mangal"/>
+        <a:font script="Telu" typeface="Gautami"/>
+        <a:font script="Taml" typeface="Latha"/>
+        <a:font script="Syrc" typeface="Estrangelo Edessa"/>
+        <a:font script="Orya" typeface="Kalinga"/>
+        <a:font script="Mlym" typeface="Kartika"/>
+        <a:font script="Laoo" typeface="DokChampa"/>
+        <a:font script="Sinh" typeface="Iskoola Pota"/>
+        <a:font script="Mong" typeface="Mongolian Baiti"/>
+        <a:font script="Viet" typeface="Times New Roman"/>
+        <a:font script="Uigh" typeface="Microsoft Uighur"/>
+        <a:font script="Geor" typeface="Sylfaen"/>
+        <a:font script="Armn" typeface="Arial"/>
+        <a:font script="Bugi" typeface="Leelawadee UI"/>
+        <a:font script="Bopo" typeface="Microsoft JhengHei"/>
+        <a:font script="Java" typeface="Javanese Text"/>
+        <a:font script="Lisu" typeface="Segoe UI"/>
+        <a:font script="Mymr" typeface="Myanmar Text"/>
+        <a:font script="Nkoo" typeface="Ebrima"/>
+        <a:font script="Olck" typeface="Nirmala UI"/>
+        <a:font script="Osma" typeface="Ebrima"/>
+        <a:font script="Phag" typeface="Phagspa"/>
+        <a:font script="Syrn" typeface="Estrangelo Edessa"/>
+        <a:font script="Syrj" typeface="Estrangelo Edessa"/>
+        <a:font script="Syre" typeface="Estrangelo Edessa"/>
+        <a:font script="Sora" typeface="Nirmala UI"/>
+        <a:font script="Tale" typeface="Microsoft Tai Le"/>
+        <a:font script="Talu" typeface="Microsoft New Tai Lue"/>
+        <a:font script="Tfng" typeface="Ebrima"/>
+      </a:majorFont>
+      <a:minorFont>
+        <a:latin typeface="Calibri" panose="020F0502020204030204"/>
+        <a:ea typeface=""/>
+        <a:cs typeface=""/>
+        <a:font script="Jpan" typeface="游ゴシック"/>
+        <a:font script="Hang" typeface="맑은 고딕"/>
+        <a:font script="Hans" typeface="等线"/>
+        <a:font script="Hant" typeface="新細明體"/>
+        <a:font script="Arab" typeface="Arial"/>
+        <a:font script="Hebr" typeface="Arial"/>
+        <a:font script="Thai" typeface="Cordia New"/>
+        <a:font script="Ethi" typeface="Nyala"/>
+        <a:font script="Beng" typeface="Vrinda"/>
+        <a:font script="Gujr" typeface="Shruti"/>
+        <a:font script="Khmr" typeface="DaunPenh"/>
+        <a:font script="Knda" typeface="Tunga"/>
+        <a:font script="Guru" typeface="Raavi"/>
+        <a:font script="Cans" typeface="Euphemia"/>
+        <a:font script="Cher" typeface="Plantagenet Cherokee"/>
+        <a:font script="Yiii" typeface="Microsoft Yi Baiti"/>
+        <a:font script="Tibt" typeface="Microsoft Himalaya"/>
+        <a:font script="Thaa" typeface="MV Boli"/>
+        <a:font script="Deva" typeface="Mangal"/>
+        <a:font script="Telu" typeface="Gautami"/>
+        <a:font script="Taml" typeface="Latha"/>
+        <a:font script="Syrc" typeface="Estrangelo Edessa"/>
+        <a:font script="Orya" typeface="Kalinga"/>
+        <a:font script="Mlym" typeface="Kartika"/>
+        <a:font script="Laoo" typeface="DokChampa"/>
+        <a:font script="Sinh" typeface="Iskoola Pota"/>
+        <a:font script="Mong" typeface="Mongolian Baiti"/>
+        <a:font script="Viet" typeface="Arial"/>
+        <a:font script="Uigh" typeface="Microsoft Uighur"/>
+        <a:font script="Geor" typeface="Sylfaen"/>
+        <a:font script="Armn" typeface="Arial"/>
+        <a:font script="Bugi" typeface="Leelawadee UI"/>
+        <a:font script="Bopo" typeface="Microsoft JhengHei"/>
+        <a:font script="Java" typeface="Javanese Text"/>
+        <a:font script="Lisu" typeface="Segoe UI"/>
+        <a:font script="Mymr" typeface="Myanmar Text"/>
+        <a:font script="Nkoo" typeface="Ebrima"/>
+        <a:font script="Olck" typeface="Nirmala UI"/>
+        <a:font script="Osma" typeface="Ebrima"/>
+        <a:font script="Phag" typeface="Phagspa"/>
+        <a:font script="Syrn" typeface="Estrangelo Edessa"/>
+        <a:font script="Syrj" typeface="Estrangelo Edessa"/>
+        <a:font script="Syre" typeface="Estrangelo Edessa"/>
+        <a:font script="Sora" typeface="Nirmala UI"/>
+        <a:font script="Tale" typeface="Microsoft Tai Le"/>
+        <a:font script="Talu" typeface="Microsoft New Tai Lue"/>
+        <a:font script="Tfng" typeface="Ebrima"/>
+      </a:minorFont>
+    </a:fontScheme>
+    <a:fmtScheme name="Office">
+      <a:fillStyleLst>
+        <a:solidFill>
+          <a:schemeClr val="phClr"/>
+        </a:solidFill>
+        <a:gradFill rotWithShape="1">
+          <a:gsLst>
+            <a:gs pos="0">
+              <a:schemeClr val="phClr">
+                <a:lumMod val="110000"/>
+                <a:satMod val="105000"/>
+                <a:tint val="67000"/>
+              </a:schemeClr>
+            </a:gs>
+            <a:gs pos="50000">
+              <a:schemeClr val="phClr">
+                <a:lumMod val="105000"/>
+                <a:satMod val="103000"/>
+                <a:tint val="73000"/>
+              </a:schemeClr>
+            </a:gs>
+            <a:gs pos="100000">
+              <a:schemeClr val="phClr">
+                <a:lumMod val="105000"/>
+                <a:satMod val="109000"/>
+                <a:tint val="81000"/>
+              </a:schemeClr>
+            </a:gs>
+          </a:gsLst>
+          <a:lin ang="5400000" scaled="0"/>
+        </a:gradFill>
+        <a:gradFill rotWithShape="1">
+          <a:gsLst>
+            <a:gs pos="0">
+              <a:schemeClr val="phClr">
+                <a:satMod val="103000"/>
+                <a:lumMod val="102000"/>
+                <a:tint val="94000"/>
+              </a:schemeClr>
+            </a:gs>
+            <a:gs pos="50000">
+              <a:schemeClr val="phClr">
+                <a:satMod val="110000"/>
+                <a:lumMod val="100000"/>
+                <a:shade val="100000"/>
+              </a:schemeClr>
+            </a:gs>
+            <a:gs pos="100000">
+              <a:schemeClr val="phClr">
+                <a:lumMod val="99000"/>
+                <a:satMod val="120000"/>
+                <a:shade val="78000"/>
+              </a:schemeClr>
+            </a:gs>
+          </a:gsLst>
+          <a:lin ang="5400000" scaled="0"/>
+        </a:gradFill>
+      </a:fillStyleLst>
+      <a:lnStyleLst>
+        <a:ln w="6350" cap="flat" cmpd="sng" algn="ctr">
+          <a:solidFill>
+            <a:schemeClr val="phClr"/>
+          </a:solidFill>
+          <a:prstDash val="solid"/>
+          <a:miter lim="800000"/>
+        </a:ln>
+        <a:ln w="12700" cap="flat" cmpd="sng" algn="ctr">
+          <a:solidFill>
+            <a:schemeClr val="phClr"/>
+          </a:solidFill>
+          <a:prstDash val="solid"/>
+          <a:miter lim="800000"/>
+        </a:ln>
+        <a:ln w="19050" cap="flat" cmpd="sng" algn="ctr">
+          <a:solidFill>
+            <a:schemeClr val="phClr"/>
+          </a:solidFill>
+          <a:prstDash val="solid"/>
+          <a:miter lim="800000"/>
+        </a:ln>
+      </a:lnStyleLst>
+      <a:effectStyleLst>
+        <a:effectStyle>
+          <a:effectLst/>
+        </a:effectStyle>
+        <a:effectStyle>
+          <a:effectLst/>
+        </a:effectStyle>
+        <a:effectStyle>
+          <a:effectLst>
+            <a:outerShdw blurRad="57150" dist="19050" dir="5400000" algn="ctr" rotWithShape="0">
+              <a:srgbClr val="000000">
+                <a:alpha val="63000"/>
+              </a:srgbClr>
+            </a:outerShdw>
+          </a:effectLst>
+        </a:effectStyle>
+      </a:effectStyleLst>
+      <a:bgFillStyleLst>
+        <a:solidFill>
+          <a:schemeClr val="phClr"/>
+        </a:solidFill>
+        <a:solidFill>
+          <a:schemeClr val="phClr">
+            <a:tint val="95000"/>
+            <a:satMod val="170000"/>
+          </a:schemeClr>
+        </a:solidFill>
+        <a:gradFill rotWithShape="1">
+          <a:gsLst>
+            <a:gs pos="0">
+              <a:schemeClr val="phClr">
+                <a:tint val="93000"/>
+                <a:satMod val="150000"/>
+                <a:shade val="98000"/>
+                <a:lumMod val="102000"/>
+              </a:schemeClr>
+            </a:gs>
+            <a:gs pos="50000">
+              <a:schemeClr val="phClr">
+                <a:tint val="98000"/>
+                <a:satMod val="130000"/>
+                <a:shade val="90000"/>
+                <a:lumMod val="103000"/>
+              </a:schemeClr>
+            </a:gs>
+            <a:gs pos="100000">
+              <a:schemeClr val="phClr">
+                <a:shade val="63000"/>
+                <a:satMod val="120000"/>
+              </a:schemeClr>
+            </a:gs>
+          </a:gsLst>
+          <a:lin ang="5400000" scaled="0"/>
+        </a:gradFill>
+      </a:bgFillStyleLst>
+    </a:fmtScheme>
+  </a:themeElements>
+  <a:objectDefaults/>
+  <a:extraClrSchemeLst/>
+  <a:extLst>
+    <a:ext uri="{05A4C25C-085E-4340-85A3-A5531E510DB2}">
+      <thm15:themeFamily xmlns:thm15="http://schemas.microsoft.com/office/thememl/2012/main" name="Office Theme" id="{62F939B6-93AF-4DB8-9C6B-D6C7DFDC589F}" vid="{4A3C46E8-61CC-4603-A589-7422A47A8E4A}"/>
+    </a:ext>
+  </a:extLst>
+</a:theme>
 </file>
</xml_diff>